<commit_message>
redid some figures for paper
</commit_message>
<xml_diff>
--- a/paper/figures/smartfarm-paper-visuals.pptx
+++ b/paper/figures/smartfarm-paper-visuals.pptx
@@ -271,7 +271,7 @@
           <a:p>
             <a:fld id="{B073D579-9A73-FA40-8BDB-9DDC146214CA}" type="datetimeFigureOut">
               <a:rPr lang="en-US" smtClean="0"/>
-              <a:t>8/21/24</a:t>
+              <a:t>8/22/24</a:t>
             </a:fld>
             <a:endParaRPr lang="en-US"/>
           </a:p>
@@ -469,7 +469,7 @@
           <a:p>
             <a:fld id="{B073D579-9A73-FA40-8BDB-9DDC146214CA}" type="datetimeFigureOut">
               <a:rPr lang="en-US" smtClean="0"/>
-              <a:t>8/21/24</a:t>
+              <a:t>8/22/24</a:t>
             </a:fld>
             <a:endParaRPr lang="en-US"/>
           </a:p>
@@ -677,7 +677,7 @@
           <a:p>
             <a:fld id="{B073D579-9A73-FA40-8BDB-9DDC146214CA}" type="datetimeFigureOut">
               <a:rPr lang="en-US" smtClean="0"/>
-              <a:t>8/21/24</a:t>
+              <a:t>8/22/24</a:t>
             </a:fld>
             <a:endParaRPr lang="en-US"/>
           </a:p>
@@ -875,7 +875,7 @@
           <a:p>
             <a:fld id="{B073D579-9A73-FA40-8BDB-9DDC146214CA}" type="datetimeFigureOut">
               <a:rPr lang="en-US" smtClean="0"/>
-              <a:t>8/21/24</a:t>
+              <a:t>8/22/24</a:t>
             </a:fld>
             <a:endParaRPr lang="en-US"/>
           </a:p>
@@ -1150,7 +1150,7 @@
           <a:p>
             <a:fld id="{B073D579-9A73-FA40-8BDB-9DDC146214CA}" type="datetimeFigureOut">
               <a:rPr lang="en-US" smtClean="0"/>
-              <a:t>8/21/24</a:t>
+              <a:t>8/22/24</a:t>
             </a:fld>
             <a:endParaRPr lang="en-US"/>
           </a:p>
@@ -1415,7 +1415,7 @@
           <a:p>
             <a:fld id="{B073D579-9A73-FA40-8BDB-9DDC146214CA}" type="datetimeFigureOut">
               <a:rPr lang="en-US" smtClean="0"/>
-              <a:t>8/21/24</a:t>
+              <a:t>8/22/24</a:t>
             </a:fld>
             <a:endParaRPr lang="en-US"/>
           </a:p>
@@ -1827,7 +1827,7 @@
           <a:p>
             <a:fld id="{B073D579-9A73-FA40-8BDB-9DDC146214CA}" type="datetimeFigureOut">
               <a:rPr lang="en-US" smtClean="0"/>
-              <a:t>8/21/24</a:t>
+              <a:t>8/22/24</a:t>
             </a:fld>
             <a:endParaRPr lang="en-US"/>
           </a:p>
@@ -1968,7 +1968,7 @@
           <a:p>
             <a:fld id="{B073D579-9A73-FA40-8BDB-9DDC146214CA}" type="datetimeFigureOut">
               <a:rPr lang="en-US" smtClean="0"/>
-              <a:t>8/21/24</a:t>
+              <a:t>8/22/24</a:t>
             </a:fld>
             <a:endParaRPr lang="en-US"/>
           </a:p>
@@ -2081,7 +2081,7 @@
           <a:p>
             <a:fld id="{B073D579-9A73-FA40-8BDB-9DDC146214CA}" type="datetimeFigureOut">
               <a:rPr lang="en-US" smtClean="0"/>
-              <a:t>8/21/24</a:t>
+              <a:t>8/22/24</a:t>
             </a:fld>
             <a:endParaRPr lang="en-US"/>
           </a:p>
@@ -2392,7 +2392,7 @@
           <a:p>
             <a:fld id="{B073D579-9A73-FA40-8BDB-9DDC146214CA}" type="datetimeFigureOut">
               <a:rPr lang="en-US" smtClean="0"/>
-              <a:t>8/21/24</a:t>
+              <a:t>8/22/24</a:t>
             </a:fld>
             <a:endParaRPr lang="en-US"/>
           </a:p>
@@ -2680,7 +2680,7 @@
           <a:p>
             <a:fld id="{B073D579-9A73-FA40-8BDB-9DDC146214CA}" type="datetimeFigureOut">
               <a:rPr lang="en-US" smtClean="0"/>
-              <a:t>8/21/24</a:t>
+              <a:t>8/22/24</a:t>
             </a:fld>
             <a:endParaRPr lang="en-US"/>
           </a:p>
@@ -2921,7 +2921,7 @@
           <a:p>
             <a:fld id="{B073D579-9A73-FA40-8BDB-9DDC146214CA}" type="datetimeFigureOut">
               <a:rPr lang="en-US" smtClean="0"/>
-              <a:t>8/21/24</a:t>
+              <a:t>8/22/24</a:t>
             </a:fld>
             <a:endParaRPr lang="en-US"/>
           </a:p>
@@ -3353,7 +3353,7 @@
           <p:nvPr/>
         </p:nvPicPr>
         <p:blipFill>
-          <a:blip r:embed="rId2"/>
+          <a:blip/>
           <a:stretch>
             <a:fillRect/>
           </a:stretch>
@@ -3383,7 +3383,7 @@
           <p:nvPr/>
         </p:nvPicPr>
         <p:blipFill>
-          <a:blip r:embed="rId2"/>
+          <a:blip/>
           <a:stretch>
             <a:fillRect/>
           </a:stretch>
@@ -3544,10 +3544,10 @@
           <p:nvPr/>
         </p:nvPicPr>
         <p:blipFill>
-          <a:blip r:embed="rId3">
+          <a:blip>
             <a:extLst>
               <a:ext uri="{837473B0-CC2E-450A-ABE3-18F120FF3D39}">
-                <a1611:picAttrSrcUrl xmlns:a1611="http://schemas.microsoft.com/office/drawing/2016/11/main" r:id="rId4"/>
+                <a1611:picAttrSrcUrl xmlns:a1611="http://schemas.microsoft.com/office/drawing/2016/11/main" r:id="rId2"/>
               </a:ext>
             </a:extLst>
           </a:blip>
@@ -3600,10 +3600,10 @@
             <p:nvPr/>
           </p:nvPicPr>
           <p:blipFill>
-            <a:blip r:embed="rId5">
+            <a:blip>
               <a:extLst>
                 <a:ext uri="{837473B0-CC2E-450A-ABE3-18F120FF3D39}">
-                  <a1611:picAttrSrcUrl xmlns:a1611="http://schemas.microsoft.com/office/drawing/2016/11/main" r:id="rId6"/>
+                  <a1611:picAttrSrcUrl xmlns:a1611="http://schemas.microsoft.com/office/drawing/2016/11/main" r:id="rId3"/>
                 </a:ext>
               </a:extLst>
             </a:blip>
@@ -4062,7 +4062,7 @@
           <p:nvPr/>
         </p:nvPicPr>
         <p:blipFill>
-          <a:blip r:embed="rId7"/>
+          <a:blip/>
           <a:stretch>
             <a:fillRect/>
           </a:stretch>
@@ -9606,10 +9606,10 @@
             <p:nvPr/>
           </p:nvPicPr>
           <p:blipFill>
-            <a:blip r:embed="rId3">
+            <a:blip>
               <a:extLst>
                 <a:ext uri="{837473B0-CC2E-450A-ABE3-18F120FF3D39}">
-                  <a1611:picAttrSrcUrl xmlns:a1611="http://schemas.microsoft.com/office/drawing/2016/11/main" r:id="rId4"/>
+                  <a1611:picAttrSrcUrl xmlns:a1611="http://schemas.microsoft.com/office/drawing/2016/11/main" r:id="rId2"/>
                 </a:ext>
               </a:extLst>
             </a:blip>
@@ -9969,250 +9969,134 @@
           <a:chExt cx="0" cy="0"/>
         </a:xfrm>
       </p:grpSpPr>
-      <p:grpSp>
-        <p:nvGrpSpPr>
-          <p:cNvPr id="48" name="Group 47">
+      <p:pic>
+        <p:nvPicPr>
+          <p:cNvPr id="5" name="Graphic 4">
             <a:extLst>
               <a:ext uri="{FF2B5EF4-FFF2-40B4-BE49-F238E27FC236}">
-                <a16:creationId xmlns:a16="http://schemas.microsoft.com/office/drawing/2014/main" id="{5F4702DF-5774-C8AE-4F77-4D459173A02B}"/>
+                <a16:creationId xmlns:a16="http://schemas.microsoft.com/office/drawing/2014/main" id="{0586AC59-E715-3323-1818-79118C8B2BD0}"/>
               </a:ext>
             </a:extLst>
           </p:cNvPr>
-          <p:cNvGrpSpPr/>
+          <p:cNvPicPr>
+            <a:picLocks noChangeAspect="1"/>
+          </p:cNvPicPr>
           <p:nvPr/>
-        </p:nvGrpSpPr>
-        <p:grpSpPr>
+        </p:nvPicPr>
+        <p:blipFill>
+          <a:blip r:embed="rId2">
+            <a:extLst>
+              <a:ext uri="{96DAC541-7B7A-43D3-8B79-37D633B846F1}">
+                <asvg:svgBlip xmlns:asvg="http://schemas.microsoft.com/office/drawing/2016/SVG/main"/>
+              </a:ext>
+              <a:ext uri="{837473B0-CC2E-450A-ABE3-18F120FF3D39}">
+                <a1611:picAttrSrcUrl xmlns:a1611="http://schemas.microsoft.com/office/drawing/2016/11/main" r:id="rId2"/>
+              </a:ext>
+            </a:extLst>
+          </a:blip>
+          <a:stretch>
+            <a:fillRect/>
+          </a:stretch>
+        </p:blipFill>
+        <p:spPr>
           <a:xfrm>
-            <a:off x="381884" y="-1330376"/>
-            <a:ext cx="4834498" cy="4666849"/>
-            <a:chOff x="472132" y="-1237849"/>
-            <a:chExt cx="4834498" cy="4666849"/>
+            <a:off x="381884" y="288473"/>
+            <a:ext cx="4834498" cy="3048000"/>
           </a:xfrm>
-        </p:grpSpPr>
-        <p:pic>
-          <p:nvPicPr>
-            <p:cNvPr id="5" name="Graphic 4">
-              <a:extLst>
-                <a:ext uri="{FF2B5EF4-FFF2-40B4-BE49-F238E27FC236}">
-                  <a16:creationId xmlns:a16="http://schemas.microsoft.com/office/drawing/2014/main" id="{0586AC59-E715-3323-1818-79118C8B2BD0}"/>
-                </a:ext>
-              </a:extLst>
-            </p:cNvPr>
-            <p:cNvPicPr>
-              <a:picLocks noChangeAspect="1"/>
-            </p:cNvPicPr>
-            <p:nvPr/>
-          </p:nvPicPr>
-          <p:blipFill>
-            <a:blip r:embed="rId2">
-              <a:extLst>
-                <a:ext uri="{96DAC541-7B7A-43D3-8B79-37D633B846F1}">
-                  <asvg:svgBlip xmlns:asvg="http://schemas.microsoft.com/office/drawing/2016/SVG/main" r:embed="rId3"/>
-                </a:ext>
-                <a:ext uri="{837473B0-CC2E-450A-ABE3-18F120FF3D39}">
-                  <a1611:picAttrSrcUrl xmlns:a1611="http://schemas.microsoft.com/office/drawing/2016/11/main" r:id="rId4"/>
-                </a:ext>
-              </a:extLst>
-            </a:blip>
-            <a:stretch>
-              <a:fillRect/>
-            </a:stretch>
-          </p:blipFill>
-          <p:spPr>
-            <a:xfrm>
-              <a:off x="472132" y="381000"/>
-              <a:ext cx="4834498" cy="3048000"/>
-            </a:xfrm>
-            <a:prstGeom prst="rect">
-              <a:avLst/>
-            </a:prstGeom>
-          </p:spPr>
-        </p:pic>
-        <p:sp>
-          <p:nvSpPr>
-            <p:cNvPr id="6" name="Arc 5">
-              <a:extLst>
-                <a:ext uri="{FF2B5EF4-FFF2-40B4-BE49-F238E27FC236}">
-                  <a16:creationId xmlns:a16="http://schemas.microsoft.com/office/drawing/2014/main" id="{714AA8AD-BC59-B4CB-F29E-80CA575A1275}"/>
-                </a:ext>
-              </a:extLst>
-            </p:cNvPr>
-            <p:cNvSpPr/>
-            <p:nvPr/>
-          </p:nvSpPr>
-          <p:spPr>
-            <a:xfrm rot="10482640">
-              <a:off x="1791811" y="-1237849"/>
-              <a:ext cx="3325400" cy="4263144"/>
-            </a:xfrm>
-            <a:prstGeom prst="arc">
-              <a:avLst>
-                <a:gd name="adj1" fmla="val 16647435"/>
-                <a:gd name="adj2" fmla="val 1504677"/>
-              </a:avLst>
-            </a:prstGeom>
-            <a:ln w="38100">
-              <a:solidFill>
-                <a:schemeClr val="tx1"/>
-              </a:solidFill>
-            </a:ln>
-          </p:spPr>
-          <p:style>
-            <a:lnRef idx="2">
-              <a:schemeClr val="accent1"/>
-            </a:lnRef>
-            <a:fillRef idx="0">
-              <a:schemeClr val="accent1"/>
-            </a:fillRef>
-            <a:effectRef idx="1">
-              <a:schemeClr val="accent1"/>
-            </a:effectRef>
-            <a:fontRef idx="minor">
+          <a:prstGeom prst="rect">
+            <a:avLst/>
+          </a:prstGeom>
+        </p:spPr>
+      </p:pic>
+      <p:sp>
+        <p:nvSpPr>
+          <p:cNvPr id="6" name="Arc 5">
+            <a:extLst>
+              <a:ext uri="{FF2B5EF4-FFF2-40B4-BE49-F238E27FC236}">
+                <a16:creationId xmlns:a16="http://schemas.microsoft.com/office/drawing/2014/main" id="{714AA8AD-BC59-B4CB-F29E-80CA575A1275}"/>
+              </a:ext>
+            </a:extLst>
+          </p:cNvPr>
+          <p:cNvSpPr/>
+          <p:nvPr/>
+        </p:nvSpPr>
+        <p:spPr>
+          <a:xfrm rot="6985934">
+            <a:off x="1230346" y="-142810"/>
+            <a:ext cx="1437990" cy="2394080"/>
+          </a:xfrm>
+          <a:prstGeom prst="arc">
+            <a:avLst>
+              <a:gd name="adj1" fmla="val 16647435"/>
+              <a:gd name="adj2" fmla="val 195705"/>
+            </a:avLst>
+          </a:prstGeom>
+          <a:ln w="38100">
+            <a:solidFill>
               <a:schemeClr val="tx1"/>
-            </a:fontRef>
-          </p:style>
-          <p:txBody>
-            <a:bodyPr rtlCol="0" anchor="ctr"/>
-            <a:lstStyle/>
-            <a:p>
-              <a:pPr algn="ctr"/>
-              <a:endParaRPr lang="en-US"/>
-            </a:p>
-          </p:txBody>
-        </p:sp>
-        <p:sp>
-          <p:nvSpPr>
-            <p:cNvPr id="7" name="5-Point Star 6">
-              <a:extLst>
-                <a:ext uri="{FF2B5EF4-FFF2-40B4-BE49-F238E27FC236}">
-                  <a16:creationId xmlns:a16="http://schemas.microsoft.com/office/drawing/2014/main" id="{A9C49CEA-E260-9A4A-1284-19F77B9E6FFB}"/>
-                </a:ext>
-              </a:extLst>
-            </p:cNvPr>
-            <p:cNvSpPr/>
-            <p:nvPr/>
-          </p:nvSpPr>
-          <p:spPr>
-            <a:xfrm>
-              <a:off x="1774624" y="1432864"/>
-              <a:ext cx="250376" cy="250372"/>
-            </a:xfrm>
-            <a:prstGeom prst="star5">
-              <a:avLst>
-                <a:gd name="adj" fmla="val 22577"/>
-                <a:gd name="hf" fmla="val 105146"/>
-                <a:gd name="vf" fmla="val 110557"/>
-              </a:avLst>
-            </a:prstGeom>
-            <a:solidFill>
-              <a:srgbClr val="FFFF00"/>
             </a:solidFill>
-            <a:ln>
-              <a:solidFill>
-                <a:schemeClr val="tx1"/>
-              </a:solidFill>
-            </a:ln>
-          </p:spPr>
-          <p:style>
-            <a:lnRef idx="2">
-              <a:schemeClr val="accent1">
-                <a:shade val="15000"/>
-              </a:schemeClr>
-            </a:lnRef>
-            <a:fillRef idx="1">
-              <a:schemeClr val="accent1"/>
-            </a:fillRef>
-            <a:effectRef idx="0">
-              <a:schemeClr val="accent1"/>
-            </a:effectRef>
-            <a:fontRef idx="minor">
-              <a:schemeClr val="lt1"/>
-            </a:fontRef>
-          </p:style>
-          <p:txBody>
-            <a:bodyPr rtlCol="0" anchor="ctr"/>
-            <a:lstStyle/>
-            <a:p>
-              <a:pPr algn="ctr"/>
-              <a:endParaRPr lang="en-US"/>
-            </a:p>
-          </p:txBody>
-        </p:sp>
-        <p:sp>
-          <p:nvSpPr>
-            <p:cNvPr id="8" name="TextBox 7">
-              <a:extLst>
-                <a:ext uri="{FF2B5EF4-FFF2-40B4-BE49-F238E27FC236}">
-                  <a16:creationId xmlns:a16="http://schemas.microsoft.com/office/drawing/2014/main" id="{32C30E4F-C930-2E1C-AE92-B87BB9ECFDB3}"/>
-                </a:ext>
-              </a:extLst>
-            </p:cNvPr>
-            <p:cNvSpPr txBox="1"/>
-            <p:nvPr/>
-          </p:nvSpPr>
-          <p:spPr>
-            <a:xfrm>
-              <a:off x="2025000" y="1504888"/>
-              <a:ext cx="1525772" cy="338554"/>
-            </a:xfrm>
-            <a:prstGeom prst="rect">
-              <a:avLst/>
-            </a:prstGeom>
-            <a:noFill/>
-          </p:spPr>
-          <p:txBody>
-            <a:bodyPr wrap="square" rtlCol="0">
-              <a:spAutoFit/>
-            </a:bodyPr>
-            <a:lstStyle/>
-            <a:p>
-              <a:r>
-                <a:rPr lang="en-US" sz="1600" dirty="0">
-                  <a:latin typeface="Garamond" panose="02020404030301010803" pitchFamily="18" charset="0"/>
-                </a:rPr>
-                <a:t>Farm location</a:t>
-              </a:r>
-            </a:p>
-          </p:txBody>
-        </p:sp>
-        <p:sp>
-          <p:nvSpPr>
-            <p:cNvPr id="9" name="TextBox 8">
-              <a:extLst>
-                <a:ext uri="{FF2B5EF4-FFF2-40B4-BE49-F238E27FC236}">
-                  <a16:creationId xmlns:a16="http://schemas.microsoft.com/office/drawing/2014/main" id="{85E798E6-7257-F7A1-C884-8B190DB4068C}"/>
-                </a:ext>
-              </a:extLst>
-            </p:cNvPr>
-            <p:cNvSpPr txBox="1"/>
-            <p:nvPr/>
-          </p:nvSpPr>
-          <p:spPr>
-            <a:xfrm>
-              <a:off x="3139647" y="3000218"/>
-              <a:ext cx="1525772" cy="338554"/>
-            </a:xfrm>
-            <a:prstGeom prst="rect">
-              <a:avLst/>
-            </a:prstGeom>
-            <a:noFill/>
-          </p:spPr>
-          <p:txBody>
-            <a:bodyPr wrap="square" rtlCol="0">
-              <a:spAutoFit/>
-            </a:bodyPr>
-            <a:lstStyle/>
-            <a:p>
-              <a:r>
-                <a:rPr lang="en-US" sz="1600" dirty="0">
-                  <a:latin typeface="Garamond" panose="02020404030301010803" pitchFamily="18" charset="0"/>
-                </a:rPr>
-                <a:t>Sun’s path</a:t>
-              </a:r>
-            </a:p>
-          </p:txBody>
-        </p:sp>
-      </p:grpSp>
+          </a:ln>
+        </p:spPr>
+        <p:style>
+          <a:lnRef idx="2">
+            <a:schemeClr val="accent1"/>
+          </a:lnRef>
+          <a:fillRef idx="0">
+            <a:schemeClr val="accent1"/>
+          </a:fillRef>
+          <a:effectRef idx="1">
+            <a:schemeClr val="accent1"/>
+          </a:effectRef>
+          <a:fontRef idx="minor">
+            <a:schemeClr val="tx1"/>
+          </a:fontRef>
+        </p:style>
+        <p:txBody>
+          <a:bodyPr rtlCol="0" anchor="ctr"/>
+          <a:lstStyle/>
+          <a:p>
+            <a:pPr algn="ctr"/>
+            <a:endParaRPr lang="en-US"/>
+          </a:p>
+        </p:txBody>
+      </p:sp>
+      <p:sp>
+        <p:nvSpPr>
+          <p:cNvPr id="8" name="TextBox 7">
+            <a:extLst>
+              <a:ext uri="{FF2B5EF4-FFF2-40B4-BE49-F238E27FC236}">
+                <a16:creationId xmlns:a16="http://schemas.microsoft.com/office/drawing/2014/main" id="{32C30E4F-C930-2E1C-AE92-B87BB9ECFDB3}"/>
+              </a:ext>
+            </a:extLst>
+          </p:cNvPr>
+          <p:cNvSpPr txBox="1"/>
+          <p:nvPr/>
+        </p:nvSpPr>
+        <p:spPr>
+          <a:xfrm>
+            <a:off x="1581625" y="2005919"/>
+            <a:ext cx="1525772" cy="338554"/>
+          </a:xfrm>
+          <a:prstGeom prst="rect">
+            <a:avLst/>
+          </a:prstGeom>
+          <a:noFill/>
+        </p:spPr>
+        <p:txBody>
+          <a:bodyPr wrap="square" rtlCol="0">
+            <a:spAutoFit/>
+          </a:bodyPr>
+          <a:lstStyle/>
+          <a:p>
+            <a:r>
+              <a:rPr lang="en-US" sz="1600" dirty="0">
+                <a:latin typeface="Garamond" panose="02020404030301010803" pitchFamily="18" charset="0"/>
+              </a:rPr>
+              <a:t>Farm location</a:t>
+            </a:r>
+          </a:p>
+        </p:txBody>
+      </p:sp>
       <p:grpSp>
         <p:nvGrpSpPr>
           <p:cNvPr id="49" name="Group 48">
@@ -10248,7 +10132,7 @@
             <p:nvPr/>
           </p:nvPicPr>
           <p:blipFill>
-            <a:blip r:embed="rId5"/>
+            <a:blip/>
             <a:stretch>
               <a:fillRect/>
             </a:stretch>
@@ -10301,7 +10185,7 @@
               <a:blip r:embed="rId6">
                 <a:extLst>
                   <a:ext uri="{96DAC541-7B7A-43D3-8B79-37D633B846F1}">
-                    <asvg:svgBlip xmlns:asvg="http://schemas.microsoft.com/office/drawing/2016/SVG/main" r:embed="rId7"/>
+                    <asvg:svgBlip xmlns:asvg="http://schemas.microsoft.com/office/drawing/2016/SVG/main"/>
                   </a:ext>
                 </a:extLst>
               </a:blip>
@@ -12023,7 +11907,7 @@
             <p:nvPr/>
           </p:nvPicPr>
           <p:blipFill>
-            <a:blip r:embed="rId8"/>
+            <a:blip/>
             <a:stretch>
               <a:fillRect/>
             </a:stretch>
@@ -12118,10 +12002,10 @@
             <p:nvPr/>
           </p:nvPicPr>
           <p:blipFill>
-            <a:blip r:embed="rId9">
+            <a:blip>
               <a:extLst>
                 <a:ext uri="{837473B0-CC2E-450A-ABE3-18F120FF3D39}">
-                  <a1611:picAttrSrcUrl xmlns:a1611="http://schemas.microsoft.com/office/drawing/2016/11/main" r:id="rId10"/>
+                  <a1611:picAttrSrcUrl xmlns:a1611="http://schemas.microsoft.com/office/drawing/2016/11/main" r:id="rId3"/>
                 </a:ext>
               </a:extLst>
             </a:blip>
@@ -12721,6 +12605,807 @@
           </p:txBody>
         </p:sp>
       </p:grpSp>
+      <p:sp>
+        <p:nvSpPr>
+          <p:cNvPr id="2" name="Oval 1">
+            <a:extLst>
+              <a:ext uri="{FF2B5EF4-FFF2-40B4-BE49-F238E27FC236}">
+                <a16:creationId xmlns:a16="http://schemas.microsoft.com/office/drawing/2014/main" id="{552F96FE-E0A3-3807-4F93-7A2E7EAB800B}"/>
+              </a:ext>
+            </a:extLst>
+          </p:cNvPr>
+          <p:cNvSpPr/>
+          <p:nvPr/>
+        </p:nvSpPr>
+        <p:spPr>
+          <a:xfrm>
+            <a:off x="2884738" y="1687062"/>
+            <a:ext cx="69516" cy="69516"/>
+          </a:xfrm>
+          <a:prstGeom prst="ellipse">
+            <a:avLst/>
+          </a:prstGeom>
+          <a:solidFill>
+            <a:schemeClr val="accent5">
+              <a:lumMod val="60000"/>
+              <a:lumOff val="40000"/>
+            </a:schemeClr>
+          </a:solidFill>
+          <a:ln>
+            <a:solidFill>
+              <a:schemeClr val="tx1"/>
+            </a:solidFill>
+          </a:ln>
+        </p:spPr>
+        <p:style>
+          <a:lnRef idx="2">
+            <a:schemeClr val="accent1">
+              <a:shade val="15000"/>
+            </a:schemeClr>
+          </a:lnRef>
+          <a:fillRef idx="1">
+            <a:schemeClr val="accent1"/>
+          </a:fillRef>
+          <a:effectRef idx="0">
+            <a:schemeClr val="accent1"/>
+          </a:effectRef>
+          <a:fontRef idx="minor">
+            <a:schemeClr val="lt1"/>
+          </a:fontRef>
+        </p:style>
+        <p:txBody>
+          <a:bodyPr rtlCol="0" anchor="ctr"/>
+          <a:lstStyle/>
+          <a:p>
+            <a:pPr algn="ctr"/>
+            <a:endParaRPr lang="en-US"/>
+          </a:p>
+        </p:txBody>
+      </p:sp>
+      <p:grpSp>
+        <p:nvGrpSpPr>
+          <p:cNvPr id="11" name="Group 10">
+            <a:extLst>
+              <a:ext uri="{FF2B5EF4-FFF2-40B4-BE49-F238E27FC236}">
+                <a16:creationId xmlns:a16="http://schemas.microsoft.com/office/drawing/2014/main" id="{C9CA73DA-F2F6-4521-A32D-124E1648BFAA}"/>
+              </a:ext>
+            </a:extLst>
+          </p:cNvPr>
+          <p:cNvGrpSpPr/>
+          <p:nvPr/>
+        </p:nvGrpSpPr>
+        <p:grpSpPr>
+          <a:xfrm>
+            <a:off x="2055157" y="1644805"/>
+            <a:ext cx="399918" cy="415798"/>
+            <a:chOff x="7971666" y="1893880"/>
+            <a:chExt cx="1641656" cy="1770172"/>
+          </a:xfrm>
+        </p:grpSpPr>
+        <p:sp>
+          <p:nvSpPr>
+            <p:cNvPr id="41" name="Rectangle 40">
+              <a:extLst>
+                <a:ext uri="{FF2B5EF4-FFF2-40B4-BE49-F238E27FC236}">
+                  <a16:creationId xmlns:a16="http://schemas.microsoft.com/office/drawing/2014/main" id="{3CAD055B-320B-E279-BBA9-175F84944B01}"/>
+                </a:ext>
+              </a:extLst>
+            </p:cNvPr>
+            <p:cNvSpPr/>
+            <p:nvPr/>
+          </p:nvSpPr>
+          <p:spPr>
+            <a:xfrm rot="2081700">
+              <a:off x="7971666" y="2275147"/>
+              <a:ext cx="1641656" cy="1008931"/>
+            </a:xfrm>
+            <a:prstGeom prst="rect">
+              <a:avLst/>
+            </a:prstGeom>
+            <a:solidFill>
+              <a:srgbClr val="92D050"/>
+            </a:solidFill>
+            <a:ln>
+              <a:solidFill>
+                <a:schemeClr val="tx1"/>
+              </a:solidFill>
+            </a:ln>
+          </p:spPr>
+          <p:style>
+            <a:lnRef idx="2">
+              <a:schemeClr val="accent1">
+                <a:shade val="15000"/>
+              </a:schemeClr>
+            </a:lnRef>
+            <a:fillRef idx="1">
+              <a:schemeClr val="accent1"/>
+            </a:fillRef>
+            <a:effectRef idx="0">
+              <a:schemeClr val="accent1"/>
+            </a:effectRef>
+            <a:fontRef idx="minor">
+              <a:schemeClr val="lt1"/>
+            </a:fontRef>
+          </p:style>
+          <p:txBody>
+            <a:bodyPr rtlCol="0" anchor="ctr"/>
+            <a:lstStyle/>
+            <a:p>
+              <a:pPr algn="ctr"/>
+              <a:endParaRPr lang="en-US"/>
+            </a:p>
+          </p:txBody>
+        </p:sp>
+        <p:sp>
+          <p:nvSpPr>
+            <p:cNvPr id="43" name="Rectangle 42">
+              <a:extLst>
+                <a:ext uri="{FF2B5EF4-FFF2-40B4-BE49-F238E27FC236}">
+                  <a16:creationId xmlns:a16="http://schemas.microsoft.com/office/drawing/2014/main" id="{35F2D6D5-4A77-EA8C-22E8-B4928C5FCE76}"/>
+                </a:ext>
+              </a:extLst>
+            </p:cNvPr>
+            <p:cNvSpPr/>
+            <p:nvPr/>
+          </p:nvSpPr>
+          <p:spPr>
+            <a:xfrm rot="2100000">
+              <a:off x="8186525" y="1893880"/>
+              <a:ext cx="66583" cy="994150"/>
+            </a:xfrm>
+            <a:prstGeom prst="rect">
+              <a:avLst/>
+            </a:prstGeom>
+            <a:solidFill>
+              <a:schemeClr val="accent6"/>
+            </a:solidFill>
+            <a:ln>
+              <a:noFill/>
+            </a:ln>
+          </p:spPr>
+          <p:style>
+            <a:lnRef idx="2">
+              <a:schemeClr val="accent1">
+                <a:shade val="15000"/>
+              </a:schemeClr>
+            </a:lnRef>
+            <a:fillRef idx="1">
+              <a:schemeClr val="accent1"/>
+            </a:fillRef>
+            <a:effectRef idx="0">
+              <a:schemeClr val="accent1"/>
+            </a:effectRef>
+            <a:fontRef idx="minor">
+              <a:schemeClr val="lt1"/>
+            </a:fontRef>
+          </p:style>
+          <p:txBody>
+            <a:bodyPr rtlCol="0" anchor="ctr"/>
+            <a:lstStyle/>
+            <a:p>
+              <a:pPr algn="ctr"/>
+              <a:endParaRPr lang="en-US"/>
+            </a:p>
+          </p:txBody>
+        </p:sp>
+        <p:sp>
+          <p:nvSpPr>
+            <p:cNvPr id="47" name="Rectangle 46">
+              <a:extLst>
+                <a:ext uri="{FF2B5EF4-FFF2-40B4-BE49-F238E27FC236}">
+                  <a16:creationId xmlns:a16="http://schemas.microsoft.com/office/drawing/2014/main" id="{F9C00B10-A8F4-46D5-69CA-990995616B87}"/>
+                </a:ext>
+              </a:extLst>
+            </p:cNvPr>
+            <p:cNvSpPr/>
+            <p:nvPr/>
+          </p:nvSpPr>
+          <p:spPr>
+            <a:xfrm rot="2100000">
+              <a:off x="8313872" y="1976909"/>
+              <a:ext cx="66583" cy="994150"/>
+            </a:xfrm>
+            <a:prstGeom prst="rect">
+              <a:avLst/>
+            </a:prstGeom>
+            <a:solidFill>
+              <a:schemeClr val="accent6"/>
+            </a:solidFill>
+            <a:ln>
+              <a:noFill/>
+            </a:ln>
+          </p:spPr>
+          <p:style>
+            <a:lnRef idx="2">
+              <a:schemeClr val="accent1">
+                <a:shade val="15000"/>
+              </a:schemeClr>
+            </a:lnRef>
+            <a:fillRef idx="1">
+              <a:schemeClr val="accent1"/>
+            </a:fillRef>
+            <a:effectRef idx="0">
+              <a:schemeClr val="accent1"/>
+            </a:effectRef>
+            <a:fontRef idx="minor">
+              <a:schemeClr val="lt1"/>
+            </a:fontRef>
+          </p:style>
+          <p:txBody>
+            <a:bodyPr rtlCol="0" anchor="ctr"/>
+            <a:lstStyle/>
+            <a:p>
+              <a:pPr algn="ctr"/>
+              <a:endParaRPr lang="en-US"/>
+            </a:p>
+          </p:txBody>
+        </p:sp>
+        <p:sp>
+          <p:nvSpPr>
+            <p:cNvPr id="50" name="Rectangle 49">
+              <a:extLst>
+                <a:ext uri="{FF2B5EF4-FFF2-40B4-BE49-F238E27FC236}">
+                  <a16:creationId xmlns:a16="http://schemas.microsoft.com/office/drawing/2014/main" id="{A9107173-5B8A-E2DA-1E3F-9815FC5E303A}"/>
+                </a:ext>
+              </a:extLst>
+            </p:cNvPr>
+            <p:cNvSpPr/>
+            <p:nvPr/>
+          </p:nvSpPr>
+          <p:spPr>
+            <a:xfrm rot="2100000">
+              <a:off x="8441620" y="2066201"/>
+              <a:ext cx="66583" cy="994150"/>
+            </a:xfrm>
+            <a:prstGeom prst="rect">
+              <a:avLst/>
+            </a:prstGeom>
+            <a:solidFill>
+              <a:schemeClr val="accent6"/>
+            </a:solidFill>
+            <a:ln>
+              <a:noFill/>
+            </a:ln>
+          </p:spPr>
+          <p:style>
+            <a:lnRef idx="2">
+              <a:schemeClr val="accent1">
+                <a:shade val="15000"/>
+              </a:schemeClr>
+            </a:lnRef>
+            <a:fillRef idx="1">
+              <a:schemeClr val="accent1"/>
+            </a:fillRef>
+            <a:effectRef idx="0">
+              <a:schemeClr val="accent1"/>
+            </a:effectRef>
+            <a:fontRef idx="minor">
+              <a:schemeClr val="lt1"/>
+            </a:fontRef>
+          </p:style>
+          <p:txBody>
+            <a:bodyPr rtlCol="0" anchor="ctr"/>
+            <a:lstStyle/>
+            <a:p>
+              <a:pPr algn="ctr"/>
+              <a:endParaRPr lang="en-US"/>
+            </a:p>
+          </p:txBody>
+        </p:sp>
+        <p:sp>
+          <p:nvSpPr>
+            <p:cNvPr id="51" name="Rectangle 50">
+              <a:extLst>
+                <a:ext uri="{FF2B5EF4-FFF2-40B4-BE49-F238E27FC236}">
+                  <a16:creationId xmlns:a16="http://schemas.microsoft.com/office/drawing/2014/main" id="{32B342D7-EA78-9CEE-63BD-A1407CAD09CF}"/>
+                </a:ext>
+              </a:extLst>
+            </p:cNvPr>
+            <p:cNvSpPr/>
+            <p:nvPr/>
+          </p:nvSpPr>
+          <p:spPr>
+            <a:xfrm rot="2100000">
+              <a:off x="8556193" y="2147835"/>
+              <a:ext cx="66583" cy="994150"/>
+            </a:xfrm>
+            <a:prstGeom prst="rect">
+              <a:avLst/>
+            </a:prstGeom>
+            <a:solidFill>
+              <a:schemeClr val="accent6"/>
+            </a:solidFill>
+            <a:ln>
+              <a:noFill/>
+            </a:ln>
+          </p:spPr>
+          <p:style>
+            <a:lnRef idx="2">
+              <a:schemeClr val="accent1">
+                <a:shade val="15000"/>
+              </a:schemeClr>
+            </a:lnRef>
+            <a:fillRef idx="1">
+              <a:schemeClr val="accent1"/>
+            </a:fillRef>
+            <a:effectRef idx="0">
+              <a:schemeClr val="accent1"/>
+            </a:effectRef>
+            <a:fontRef idx="minor">
+              <a:schemeClr val="lt1"/>
+            </a:fontRef>
+          </p:style>
+          <p:txBody>
+            <a:bodyPr rtlCol="0" anchor="ctr"/>
+            <a:lstStyle/>
+            <a:p>
+              <a:pPr algn="ctr"/>
+              <a:endParaRPr lang="en-US"/>
+            </a:p>
+          </p:txBody>
+        </p:sp>
+        <p:sp>
+          <p:nvSpPr>
+            <p:cNvPr id="52" name="Rectangle 51">
+              <a:extLst>
+                <a:ext uri="{FF2B5EF4-FFF2-40B4-BE49-F238E27FC236}">
+                  <a16:creationId xmlns:a16="http://schemas.microsoft.com/office/drawing/2014/main" id="{F17C4F2A-4D53-8D82-E421-EDBAF08AAE15}"/>
+                </a:ext>
+              </a:extLst>
+            </p:cNvPr>
+            <p:cNvSpPr/>
+            <p:nvPr/>
+          </p:nvSpPr>
+          <p:spPr>
+            <a:xfrm rot="2100000">
+              <a:off x="8683540" y="2230864"/>
+              <a:ext cx="66583" cy="994150"/>
+            </a:xfrm>
+            <a:prstGeom prst="rect">
+              <a:avLst/>
+            </a:prstGeom>
+            <a:solidFill>
+              <a:schemeClr val="accent6"/>
+            </a:solidFill>
+            <a:ln>
+              <a:noFill/>
+            </a:ln>
+          </p:spPr>
+          <p:style>
+            <a:lnRef idx="2">
+              <a:schemeClr val="accent1">
+                <a:shade val="15000"/>
+              </a:schemeClr>
+            </a:lnRef>
+            <a:fillRef idx="1">
+              <a:schemeClr val="accent1"/>
+            </a:fillRef>
+            <a:effectRef idx="0">
+              <a:schemeClr val="accent1"/>
+            </a:effectRef>
+            <a:fontRef idx="minor">
+              <a:schemeClr val="lt1"/>
+            </a:fontRef>
+          </p:style>
+          <p:txBody>
+            <a:bodyPr rtlCol="0" anchor="ctr"/>
+            <a:lstStyle/>
+            <a:p>
+              <a:pPr algn="ctr"/>
+              <a:endParaRPr lang="en-US"/>
+            </a:p>
+          </p:txBody>
+        </p:sp>
+        <p:sp>
+          <p:nvSpPr>
+            <p:cNvPr id="53" name="Rectangle 52">
+              <a:extLst>
+                <a:ext uri="{FF2B5EF4-FFF2-40B4-BE49-F238E27FC236}">
+                  <a16:creationId xmlns:a16="http://schemas.microsoft.com/office/drawing/2014/main" id="{8B107BFA-D2F1-6700-7275-D64EA537D5E6}"/>
+                </a:ext>
+              </a:extLst>
+            </p:cNvPr>
+            <p:cNvSpPr/>
+            <p:nvPr/>
+          </p:nvSpPr>
+          <p:spPr>
+            <a:xfrm rot="2100000">
+              <a:off x="8811288" y="2320156"/>
+              <a:ext cx="66583" cy="994150"/>
+            </a:xfrm>
+            <a:prstGeom prst="rect">
+              <a:avLst/>
+            </a:prstGeom>
+            <a:solidFill>
+              <a:schemeClr val="accent6"/>
+            </a:solidFill>
+            <a:ln>
+              <a:noFill/>
+            </a:ln>
+          </p:spPr>
+          <p:style>
+            <a:lnRef idx="2">
+              <a:schemeClr val="accent1">
+                <a:shade val="15000"/>
+              </a:schemeClr>
+            </a:lnRef>
+            <a:fillRef idx="1">
+              <a:schemeClr val="accent1"/>
+            </a:fillRef>
+            <a:effectRef idx="0">
+              <a:schemeClr val="accent1"/>
+            </a:effectRef>
+            <a:fontRef idx="minor">
+              <a:schemeClr val="lt1"/>
+            </a:fontRef>
+          </p:style>
+          <p:txBody>
+            <a:bodyPr rtlCol="0" anchor="ctr"/>
+            <a:lstStyle/>
+            <a:p>
+              <a:pPr algn="ctr"/>
+              <a:endParaRPr lang="en-US"/>
+            </a:p>
+          </p:txBody>
+        </p:sp>
+        <p:sp>
+          <p:nvSpPr>
+            <p:cNvPr id="54" name="Rectangle 53">
+              <a:extLst>
+                <a:ext uri="{FF2B5EF4-FFF2-40B4-BE49-F238E27FC236}">
+                  <a16:creationId xmlns:a16="http://schemas.microsoft.com/office/drawing/2014/main" id="{08DEAA11-DCE4-CE89-A88E-6158BD587F75}"/>
+                </a:ext>
+              </a:extLst>
+            </p:cNvPr>
+            <p:cNvSpPr/>
+            <p:nvPr/>
+          </p:nvSpPr>
+          <p:spPr>
+            <a:xfrm rot="2100000">
+              <a:off x="8937483" y="2401790"/>
+              <a:ext cx="66583" cy="994150"/>
+            </a:xfrm>
+            <a:prstGeom prst="rect">
+              <a:avLst/>
+            </a:prstGeom>
+            <a:solidFill>
+              <a:schemeClr val="accent6"/>
+            </a:solidFill>
+            <a:ln>
+              <a:noFill/>
+            </a:ln>
+          </p:spPr>
+          <p:style>
+            <a:lnRef idx="2">
+              <a:schemeClr val="accent1">
+                <a:shade val="15000"/>
+              </a:schemeClr>
+            </a:lnRef>
+            <a:fillRef idx="1">
+              <a:schemeClr val="accent1"/>
+            </a:fillRef>
+            <a:effectRef idx="0">
+              <a:schemeClr val="accent1"/>
+            </a:effectRef>
+            <a:fontRef idx="minor">
+              <a:schemeClr val="lt1"/>
+            </a:fontRef>
+          </p:style>
+          <p:txBody>
+            <a:bodyPr rtlCol="0" anchor="ctr"/>
+            <a:lstStyle/>
+            <a:p>
+              <a:pPr algn="ctr"/>
+              <a:endParaRPr lang="en-US"/>
+            </a:p>
+          </p:txBody>
+        </p:sp>
+        <p:sp>
+          <p:nvSpPr>
+            <p:cNvPr id="55" name="Rectangle 54">
+              <a:extLst>
+                <a:ext uri="{FF2B5EF4-FFF2-40B4-BE49-F238E27FC236}">
+                  <a16:creationId xmlns:a16="http://schemas.microsoft.com/office/drawing/2014/main" id="{6DDF9F1A-0F68-B166-AAE5-E4DC17AEA5C0}"/>
+                </a:ext>
+              </a:extLst>
+            </p:cNvPr>
+            <p:cNvSpPr/>
+            <p:nvPr/>
+          </p:nvSpPr>
+          <p:spPr>
+            <a:xfrm rot="2100000">
+              <a:off x="9064830" y="2484819"/>
+              <a:ext cx="66583" cy="994150"/>
+            </a:xfrm>
+            <a:prstGeom prst="rect">
+              <a:avLst/>
+            </a:prstGeom>
+            <a:solidFill>
+              <a:schemeClr val="accent6"/>
+            </a:solidFill>
+            <a:ln>
+              <a:noFill/>
+            </a:ln>
+          </p:spPr>
+          <p:style>
+            <a:lnRef idx="2">
+              <a:schemeClr val="accent1">
+                <a:shade val="15000"/>
+              </a:schemeClr>
+            </a:lnRef>
+            <a:fillRef idx="1">
+              <a:schemeClr val="accent1"/>
+            </a:fillRef>
+            <a:effectRef idx="0">
+              <a:schemeClr val="accent1"/>
+            </a:effectRef>
+            <a:fontRef idx="minor">
+              <a:schemeClr val="lt1"/>
+            </a:fontRef>
+          </p:style>
+          <p:txBody>
+            <a:bodyPr rtlCol="0" anchor="ctr"/>
+            <a:lstStyle/>
+            <a:p>
+              <a:pPr algn="ctr"/>
+              <a:endParaRPr lang="en-US"/>
+            </a:p>
+          </p:txBody>
+        </p:sp>
+        <p:sp>
+          <p:nvSpPr>
+            <p:cNvPr id="56" name="Rectangle 55">
+              <a:extLst>
+                <a:ext uri="{FF2B5EF4-FFF2-40B4-BE49-F238E27FC236}">
+                  <a16:creationId xmlns:a16="http://schemas.microsoft.com/office/drawing/2014/main" id="{A115BAB6-9B91-BDC6-9773-5EA9EA7BE21A}"/>
+                </a:ext>
+              </a:extLst>
+            </p:cNvPr>
+            <p:cNvSpPr/>
+            <p:nvPr/>
+          </p:nvSpPr>
+          <p:spPr>
+            <a:xfrm rot="2100000">
+              <a:off x="9192578" y="2574111"/>
+              <a:ext cx="66583" cy="994150"/>
+            </a:xfrm>
+            <a:prstGeom prst="rect">
+              <a:avLst/>
+            </a:prstGeom>
+            <a:solidFill>
+              <a:schemeClr val="accent6"/>
+            </a:solidFill>
+            <a:ln>
+              <a:noFill/>
+            </a:ln>
+          </p:spPr>
+          <p:style>
+            <a:lnRef idx="2">
+              <a:schemeClr val="accent1">
+                <a:shade val="15000"/>
+              </a:schemeClr>
+            </a:lnRef>
+            <a:fillRef idx="1">
+              <a:schemeClr val="accent1"/>
+            </a:fillRef>
+            <a:effectRef idx="0">
+              <a:schemeClr val="accent1"/>
+            </a:effectRef>
+            <a:fontRef idx="minor">
+              <a:schemeClr val="lt1"/>
+            </a:fontRef>
+          </p:style>
+          <p:txBody>
+            <a:bodyPr rtlCol="0" anchor="ctr"/>
+            <a:lstStyle/>
+            <a:p>
+              <a:pPr algn="ctr"/>
+              <a:endParaRPr lang="en-US"/>
+            </a:p>
+          </p:txBody>
+        </p:sp>
+        <p:sp>
+          <p:nvSpPr>
+            <p:cNvPr id="57" name="Rectangle 56">
+              <a:extLst>
+                <a:ext uri="{FF2B5EF4-FFF2-40B4-BE49-F238E27FC236}">
+                  <a16:creationId xmlns:a16="http://schemas.microsoft.com/office/drawing/2014/main" id="{EF6FC031-9F8E-A343-8ED7-59951449C431}"/>
+                </a:ext>
+              </a:extLst>
+            </p:cNvPr>
+            <p:cNvSpPr/>
+            <p:nvPr/>
+          </p:nvSpPr>
+          <p:spPr>
+            <a:xfrm rot="2100000">
+              <a:off x="9320568" y="2669902"/>
+              <a:ext cx="66583" cy="994150"/>
+            </a:xfrm>
+            <a:prstGeom prst="rect">
+              <a:avLst/>
+            </a:prstGeom>
+            <a:solidFill>
+              <a:schemeClr val="accent6"/>
+            </a:solidFill>
+            <a:ln>
+              <a:noFill/>
+            </a:ln>
+          </p:spPr>
+          <p:style>
+            <a:lnRef idx="2">
+              <a:schemeClr val="accent1">
+                <a:shade val="15000"/>
+              </a:schemeClr>
+            </a:lnRef>
+            <a:fillRef idx="1">
+              <a:schemeClr val="accent1"/>
+            </a:fillRef>
+            <a:effectRef idx="0">
+              <a:schemeClr val="accent1"/>
+            </a:effectRef>
+            <a:fontRef idx="minor">
+              <a:schemeClr val="lt1"/>
+            </a:fontRef>
+          </p:style>
+          <p:txBody>
+            <a:bodyPr rtlCol="0" anchor="ctr"/>
+            <a:lstStyle/>
+            <a:p>
+              <a:pPr algn="ctr"/>
+              <a:endParaRPr lang="en-US"/>
+            </a:p>
+          </p:txBody>
+        </p:sp>
+      </p:grpSp>
+      <p:sp>
+        <p:nvSpPr>
+          <p:cNvPr id="66" name="TextBox 65">
+            <a:extLst>
+              <a:ext uri="{FF2B5EF4-FFF2-40B4-BE49-F238E27FC236}">
+                <a16:creationId xmlns:a16="http://schemas.microsoft.com/office/drawing/2014/main" id="{4687A6DB-088C-6B9D-4FFA-2AD5FA38C968}"/>
+              </a:ext>
+            </a:extLst>
+          </p:cNvPr>
+          <p:cNvSpPr txBox="1"/>
+          <p:nvPr/>
+        </p:nvSpPr>
+        <p:spPr>
+          <a:xfrm>
+            <a:off x="2954234" y="1429432"/>
+            <a:ext cx="1525772" cy="584775"/>
+          </a:xfrm>
+          <a:prstGeom prst="rect">
+            <a:avLst/>
+          </a:prstGeom>
+          <a:noFill/>
+        </p:spPr>
+        <p:txBody>
+          <a:bodyPr wrap="square" rtlCol="0">
+            <a:spAutoFit/>
+          </a:bodyPr>
+          <a:lstStyle/>
+          <a:p>
+            <a:r>
+              <a:rPr lang="en-US" sz="1600" dirty="0">
+                <a:latin typeface="Garamond" panose="02020404030301010803" pitchFamily="18" charset="0"/>
+              </a:rPr>
+              <a:t>Sun’s location</a:t>
+            </a:r>
+          </a:p>
+          <a:p>
+            <a:r>
+              <a:rPr lang="en-US" sz="1600" dirty="0">
+                <a:latin typeface="Garamond" panose="02020404030301010803" pitchFamily="18" charset="0"/>
+              </a:rPr>
+              <a:t>at sunrise</a:t>
+            </a:r>
+          </a:p>
+        </p:txBody>
+      </p:sp>
+      <p:sp>
+        <p:nvSpPr>
+          <p:cNvPr id="67" name="TextBox 66">
+            <a:extLst>
+              <a:ext uri="{FF2B5EF4-FFF2-40B4-BE49-F238E27FC236}">
+                <a16:creationId xmlns:a16="http://schemas.microsoft.com/office/drawing/2014/main" id="{747BA18B-493B-F6BD-8945-6262D2DFCF6C}"/>
+              </a:ext>
+            </a:extLst>
+          </p:cNvPr>
+          <p:cNvSpPr txBox="1"/>
+          <p:nvPr/>
+        </p:nvSpPr>
+        <p:spPr>
+          <a:xfrm>
+            <a:off x="380320" y="1066478"/>
+            <a:ext cx="1525772" cy="584775"/>
+          </a:xfrm>
+          <a:prstGeom prst="rect">
+            <a:avLst/>
+          </a:prstGeom>
+          <a:noFill/>
+        </p:spPr>
+        <p:txBody>
+          <a:bodyPr wrap="square" rtlCol="0">
+            <a:spAutoFit/>
+          </a:bodyPr>
+          <a:lstStyle/>
+          <a:p>
+            <a:pPr algn="r"/>
+            <a:r>
+              <a:rPr lang="en-US" sz="1600" dirty="0">
+                <a:latin typeface="Garamond" panose="02020404030301010803" pitchFamily="18" charset="0"/>
+              </a:rPr>
+              <a:t>Sun’s location</a:t>
+            </a:r>
+          </a:p>
+          <a:p>
+            <a:pPr algn="r"/>
+            <a:r>
+              <a:rPr lang="en-US" sz="1600" dirty="0">
+                <a:latin typeface="Garamond" panose="02020404030301010803" pitchFamily="18" charset="0"/>
+              </a:rPr>
+              <a:t>at sunset</a:t>
+            </a:r>
+          </a:p>
+        </p:txBody>
+      </p:sp>
+      <p:sp>
+        <p:nvSpPr>
+          <p:cNvPr id="69" name="Oval 68">
+            <a:extLst>
+              <a:ext uri="{FF2B5EF4-FFF2-40B4-BE49-F238E27FC236}">
+                <a16:creationId xmlns:a16="http://schemas.microsoft.com/office/drawing/2014/main" id="{C7D9D530-F938-3ABA-F5D3-DD698AC900EC}"/>
+              </a:ext>
+            </a:extLst>
+          </p:cNvPr>
+          <p:cNvSpPr/>
+          <p:nvPr/>
+        </p:nvSpPr>
+        <p:spPr>
+          <a:xfrm>
+            <a:off x="1561522" y="1641611"/>
+            <a:ext cx="69516" cy="69516"/>
+          </a:xfrm>
+          <a:prstGeom prst="ellipse">
+            <a:avLst/>
+          </a:prstGeom>
+          <a:solidFill>
+            <a:schemeClr val="accent5">
+              <a:lumMod val="60000"/>
+              <a:lumOff val="40000"/>
+            </a:schemeClr>
+          </a:solidFill>
+          <a:ln>
+            <a:solidFill>
+              <a:schemeClr val="tx1"/>
+            </a:solidFill>
+          </a:ln>
+        </p:spPr>
+        <p:style>
+          <a:lnRef idx="2">
+            <a:schemeClr val="accent1">
+              <a:shade val="15000"/>
+            </a:schemeClr>
+          </a:lnRef>
+          <a:fillRef idx="1">
+            <a:schemeClr val="accent1"/>
+          </a:fillRef>
+          <a:effectRef idx="0">
+            <a:schemeClr val="accent1"/>
+          </a:effectRef>
+          <a:fontRef idx="minor">
+            <a:schemeClr val="lt1"/>
+          </a:fontRef>
+        </p:style>
+        <p:txBody>
+          <a:bodyPr rtlCol="0" anchor="ctr"/>
+          <a:lstStyle/>
+          <a:p>
+            <a:pPr algn="ctr"/>
+            <a:endParaRPr lang="en-US"/>
+          </a:p>
+        </p:txBody>
+      </p:sp>
     </p:spTree>
     <p:extLst>
       <p:ext uri="{BB962C8B-B14F-4D97-AF65-F5344CB8AC3E}">

</xml_diff>

<commit_message>
changes made during quals prep
</commit_message>
<xml_diff>
--- a/paper/figures/smartfarm-paper-visuals.pptx
+++ b/paper/figures/smartfarm-paper-visuals.pptx
@@ -4,6 +4,9 @@
   <p:sldMasterIdLst>
     <p:sldMasterId id="2147483648" r:id="rId1"/>
   </p:sldMasterIdLst>
+  <p:notesMasterIdLst>
+    <p:notesMasterId r:id="rId4"/>
+  </p:notesMasterIdLst>
   <p:sldIdLst>
     <p:sldId id="256" r:id="rId2"/>
     <p:sldId id="257" r:id="rId3"/>
@@ -122,6 +125,439 @@
     </p:ext>
   </p:extLst>
 </p:presentation>
+</file>
+
+<file path=ppt/notesMasters/notesMaster1.xml><?xml version="1.0" encoding="utf-8"?>
+<p:notesMaster xmlns:a="http://schemas.openxmlformats.org/drawingml/2006/main" xmlns:r="http://schemas.openxmlformats.org/officeDocument/2006/relationships" xmlns:p="http://schemas.openxmlformats.org/presentationml/2006/main">
+  <p:cSld>
+    <p:bg>
+      <p:bgRef idx="1001">
+        <a:schemeClr val="bg1"/>
+      </p:bgRef>
+    </p:bg>
+    <p:spTree>
+      <p:nvGrpSpPr>
+        <p:cNvPr id="1" name=""/>
+        <p:cNvGrpSpPr/>
+        <p:nvPr/>
+      </p:nvGrpSpPr>
+      <p:grpSpPr>
+        <a:xfrm>
+          <a:off x="0" y="0"/>
+          <a:ext cx="0" cy="0"/>
+          <a:chOff x="0" y="0"/>
+          <a:chExt cx="0" cy="0"/>
+        </a:xfrm>
+      </p:grpSpPr>
+      <p:sp>
+        <p:nvSpPr>
+          <p:cNvPr id="2" name="Header Placeholder 1"/>
+          <p:cNvSpPr>
+            <a:spLocks noGrp="1"/>
+          </p:cNvSpPr>
+          <p:nvPr>
+            <p:ph type="hdr" sz="quarter"/>
+          </p:nvPr>
+        </p:nvSpPr>
+        <p:spPr>
+          <a:xfrm>
+            <a:off x="0" y="0"/>
+            <a:ext cx="2971800" cy="458788"/>
+          </a:xfrm>
+          <a:prstGeom prst="rect">
+            <a:avLst/>
+          </a:prstGeom>
+        </p:spPr>
+        <p:txBody>
+          <a:bodyPr vert="horz" lIns="91440" tIns="45720" rIns="91440" bIns="45720" rtlCol="0"/>
+          <a:lstStyle>
+            <a:lvl1pPr algn="l">
+              <a:defRPr sz="1200"/>
+            </a:lvl1pPr>
+          </a:lstStyle>
+          <a:p>
+            <a:endParaRPr lang="en-US"/>
+          </a:p>
+        </p:txBody>
+      </p:sp>
+      <p:sp>
+        <p:nvSpPr>
+          <p:cNvPr id="3" name="Date Placeholder 2"/>
+          <p:cNvSpPr>
+            <a:spLocks noGrp="1"/>
+          </p:cNvSpPr>
+          <p:nvPr>
+            <p:ph type="dt" idx="1"/>
+          </p:nvPr>
+        </p:nvSpPr>
+        <p:spPr>
+          <a:xfrm>
+            <a:off x="3884613" y="0"/>
+            <a:ext cx="2971800" cy="458788"/>
+          </a:xfrm>
+          <a:prstGeom prst="rect">
+            <a:avLst/>
+          </a:prstGeom>
+        </p:spPr>
+        <p:txBody>
+          <a:bodyPr vert="horz" lIns="91440" tIns="45720" rIns="91440" bIns="45720" rtlCol="0"/>
+          <a:lstStyle>
+            <a:lvl1pPr algn="r">
+              <a:defRPr sz="1200"/>
+            </a:lvl1pPr>
+          </a:lstStyle>
+          <a:p>
+            <a:fld id="{F6C2B03F-2EBA-2A48-8471-A8412CAB6F5B}" type="datetimeFigureOut">
+              <a:rPr lang="en-US" smtClean="0"/>
+              <a:t>11/1/24</a:t>
+            </a:fld>
+            <a:endParaRPr lang="en-US"/>
+          </a:p>
+        </p:txBody>
+      </p:sp>
+      <p:sp>
+        <p:nvSpPr>
+          <p:cNvPr id="4" name="Slide Image Placeholder 3"/>
+          <p:cNvSpPr>
+            <a:spLocks noGrp="1" noRot="1" noChangeAspect="1"/>
+          </p:cNvSpPr>
+          <p:nvPr>
+            <p:ph type="sldImg" idx="2"/>
+          </p:nvPr>
+        </p:nvSpPr>
+        <p:spPr>
+          <a:xfrm>
+            <a:off x="685800" y="1143000"/>
+            <a:ext cx="5486400" cy="3086100"/>
+          </a:xfrm>
+          <a:prstGeom prst="rect">
+            <a:avLst/>
+          </a:prstGeom>
+          <a:noFill/>
+          <a:ln w="12700">
+            <a:solidFill>
+              <a:prstClr val="black"/>
+            </a:solidFill>
+          </a:ln>
+        </p:spPr>
+        <p:txBody>
+          <a:bodyPr vert="horz" lIns="91440" tIns="45720" rIns="91440" bIns="45720" rtlCol="0" anchor="ctr"/>
+          <a:lstStyle/>
+          <a:p>
+            <a:endParaRPr lang="en-US"/>
+          </a:p>
+        </p:txBody>
+      </p:sp>
+      <p:sp>
+        <p:nvSpPr>
+          <p:cNvPr id="5" name="Notes Placeholder 4"/>
+          <p:cNvSpPr>
+            <a:spLocks noGrp="1"/>
+          </p:cNvSpPr>
+          <p:nvPr>
+            <p:ph type="body" sz="quarter" idx="3"/>
+          </p:nvPr>
+        </p:nvSpPr>
+        <p:spPr>
+          <a:xfrm>
+            <a:off x="685800" y="4400550"/>
+            <a:ext cx="5486400" cy="3600450"/>
+          </a:xfrm>
+          <a:prstGeom prst="rect">
+            <a:avLst/>
+          </a:prstGeom>
+        </p:spPr>
+        <p:txBody>
+          <a:bodyPr vert="horz" lIns="91440" tIns="45720" rIns="91440" bIns="45720" rtlCol="0"/>
+          <a:lstStyle/>
+          <a:p>
+            <a:pPr lvl="0"/>
+            <a:r>
+              <a:rPr lang="en-US"/>
+              <a:t>Click to edit Master text styles</a:t>
+            </a:r>
+          </a:p>
+          <a:p>
+            <a:pPr lvl="1"/>
+            <a:r>
+              <a:rPr lang="en-US"/>
+              <a:t>Second level</a:t>
+            </a:r>
+          </a:p>
+          <a:p>
+            <a:pPr lvl="2"/>
+            <a:r>
+              <a:rPr lang="en-US"/>
+              <a:t>Third level</a:t>
+            </a:r>
+          </a:p>
+          <a:p>
+            <a:pPr lvl="3"/>
+            <a:r>
+              <a:rPr lang="en-US"/>
+              <a:t>Fourth level</a:t>
+            </a:r>
+          </a:p>
+          <a:p>
+            <a:pPr lvl="4"/>
+            <a:r>
+              <a:rPr lang="en-US"/>
+              <a:t>Fifth level</a:t>
+            </a:r>
+          </a:p>
+        </p:txBody>
+      </p:sp>
+      <p:sp>
+        <p:nvSpPr>
+          <p:cNvPr id="6" name="Footer Placeholder 5"/>
+          <p:cNvSpPr>
+            <a:spLocks noGrp="1"/>
+          </p:cNvSpPr>
+          <p:nvPr>
+            <p:ph type="ftr" sz="quarter" idx="4"/>
+          </p:nvPr>
+        </p:nvSpPr>
+        <p:spPr>
+          <a:xfrm>
+            <a:off x="0" y="8685213"/>
+            <a:ext cx="2971800" cy="458787"/>
+          </a:xfrm>
+          <a:prstGeom prst="rect">
+            <a:avLst/>
+          </a:prstGeom>
+        </p:spPr>
+        <p:txBody>
+          <a:bodyPr vert="horz" lIns="91440" tIns="45720" rIns="91440" bIns="45720" rtlCol="0" anchor="b"/>
+          <a:lstStyle>
+            <a:lvl1pPr algn="l">
+              <a:defRPr sz="1200"/>
+            </a:lvl1pPr>
+          </a:lstStyle>
+          <a:p>
+            <a:endParaRPr lang="en-US"/>
+          </a:p>
+        </p:txBody>
+      </p:sp>
+      <p:sp>
+        <p:nvSpPr>
+          <p:cNvPr id="7" name="Slide Number Placeholder 6"/>
+          <p:cNvSpPr>
+            <a:spLocks noGrp="1"/>
+          </p:cNvSpPr>
+          <p:nvPr>
+            <p:ph type="sldNum" sz="quarter" idx="5"/>
+          </p:nvPr>
+        </p:nvSpPr>
+        <p:spPr>
+          <a:xfrm>
+            <a:off x="3884613" y="8685213"/>
+            <a:ext cx="2971800" cy="458787"/>
+          </a:xfrm>
+          <a:prstGeom prst="rect">
+            <a:avLst/>
+          </a:prstGeom>
+        </p:spPr>
+        <p:txBody>
+          <a:bodyPr vert="horz" lIns="91440" tIns="45720" rIns="91440" bIns="45720" rtlCol="0" anchor="b"/>
+          <a:lstStyle>
+            <a:lvl1pPr algn="r">
+              <a:defRPr sz="1200"/>
+            </a:lvl1pPr>
+          </a:lstStyle>
+          <a:p>
+            <a:fld id="{6469EE85-7B02-0A41-8298-A4EE8A600E59}" type="slidenum">
+              <a:rPr lang="en-US" smtClean="0"/>
+              <a:t>‹#›</a:t>
+            </a:fld>
+            <a:endParaRPr lang="en-US"/>
+          </a:p>
+        </p:txBody>
+      </p:sp>
+    </p:spTree>
+    <p:extLst>
+      <p:ext uri="{BB962C8B-B14F-4D97-AF65-F5344CB8AC3E}">
+        <p14:creationId xmlns:p14="http://schemas.microsoft.com/office/powerpoint/2010/main" val="1627865163"/>
+      </p:ext>
+    </p:extLst>
+  </p:cSld>
+  <p:clrMap bg1="lt1" tx1="dk1" bg2="lt2" tx2="dk2" accent1="accent1" accent2="accent2" accent3="accent3" accent4="accent4" accent5="accent5" accent6="accent6" hlink="hlink" folHlink="folHlink"/>
+  <p:notesStyle>
+    <a:lvl1pPr marL="0" algn="l" defTabSz="914400" rtl="0" eaLnBrk="1" latinLnBrk="0" hangingPunct="1">
+      <a:defRPr sz="1200" kern="1200">
+        <a:solidFill>
+          <a:schemeClr val="tx1"/>
+        </a:solidFill>
+        <a:latin typeface="+mn-lt"/>
+        <a:ea typeface="+mn-ea"/>
+        <a:cs typeface="+mn-cs"/>
+      </a:defRPr>
+    </a:lvl1pPr>
+    <a:lvl2pPr marL="457200" algn="l" defTabSz="914400" rtl="0" eaLnBrk="1" latinLnBrk="0" hangingPunct="1">
+      <a:defRPr sz="1200" kern="1200">
+        <a:solidFill>
+          <a:schemeClr val="tx1"/>
+        </a:solidFill>
+        <a:latin typeface="+mn-lt"/>
+        <a:ea typeface="+mn-ea"/>
+        <a:cs typeface="+mn-cs"/>
+      </a:defRPr>
+    </a:lvl2pPr>
+    <a:lvl3pPr marL="914400" algn="l" defTabSz="914400" rtl="0" eaLnBrk="1" latinLnBrk="0" hangingPunct="1">
+      <a:defRPr sz="1200" kern="1200">
+        <a:solidFill>
+          <a:schemeClr val="tx1"/>
+        </a:solidFill>
+        <a:latin typeface="+mn-lt"/>
+        <a:ea typeface="+mn-ea"/>
+        <a:cs typeface="+mn-cs"/>
+      </a:defRPr>
+    </a:lvl3pPr>
+    <a:lvl4pPr marL="1371600" algn="l" defTabSz="914400" rtl="0" eaLnBrk="1" latinLnBrk="0" hangingPunct="1">
+      <a:defRPr sz="1200" kern="1200">
+        <a:solidFill>
+          <a:schemeClr val="tx1"/>
+        </a:solidFill>
+        <a:latin typeface="+mn-lt"/>
+        <a:ea typeface="+mn-ea"/>
+        <a:cs typeface="+mn-cs"/>
+      </a:defRPr>
+    </a:lvl4pPr>
+    <a:lvl5pPr marL="1828800" algn="l" defTabSz="914400" rtl="0" eaLnBrk="1" latinLnBrk="0" hangingPunct="1">
+      <a:defRPr sz="1200" kern="1200">
+        <a:solidFill>
+          <a:schemeClr val="tx1"/>
+        </a:solidFill>
+        <a:latin typeface="+mn-lt"/>
+        <a:ea typeface="+mn-ea"/>
+        <a:cs typeface="+mn-cs"/>
+      </a:defRPr>
+    </a:lvl5pPr>
+    <a:lvl6pPr marL="2286000" algn="l" defTabSz="914400" rtl="0" eaLnBrk="1" latinLnBrk="0" hangingPunct="1">
+      <a:defRPr sz="1200" kern="1200">
+        <a:solidFill>
+          <a:schemeClr val="tx1"/>
+        </a:solidFill>
+        <a:latin typeface="+mn-lt"/>
+        <a:ea typeface="+mn-ea"/>
+        <a:cs typeface="+mn-cs"/>
+      </a:defRPr>
+    </a:lvl6pPr>
+    <a:lvl7pPr marL="2743200" algn="l" defTabSz="914400" rtl="0" eaLnBrk="1" latinLnBrk="0" hangingPunct="1">
+      <a:defRPr sz="1200" kern="1200">
+        <a:solidFill>
+          <a:schemeClr val="tx1"/>
+        </a:solidFill>
+        <a:latin typeface="+mn-lt"/>
+        <a:ea typeface="+mn-ea"/>
+        <a:cs typeface="+mn-cs"/>
+      </a:defRPr>
+    </a:lvl7pPr>
+    <a:lvl8pPr marL="3200400" algn="l" defTabSz="914400" rtl="0" eaLnBrk="1" latinLnBrk="0" hangingPunct="1">
+      <a:defRPr sz="1200" kern="1200">
+        <a:solidFill>
+          <a:schemeClr val="tx1"/>
+        </a:solidFill>
+        <a:latin typeface="+mn-lt"/>
+        <a:ea typeface="+mn-ea"/>
+        <a:cs typeface="+mn-cs"/>
+      </a:defRPr>
+    </a:lvl8pPr>
+    <a:lvl9pPr marL="3657600" algn="l" defTabSz="914400" rtl="0" eaLnBrk="1" latinLnBrk="0" hangingPunct="1">
+      <a:defRPr sz="1200" kern="1200">
+        <a:solidFill>
+          <a:schemeClr val="tx1"/>
+        </a:solidFill>
+        <a:latin typeface="+mn-lt"/>
+        <a:ea typeface="+mn-ea"/>
+        <a:cs typeface="+mn-cs"/>
+      </a:defRPr>
+    </a:lvl9pPr>
+  </p:notesStyle>
+</p:notesMaster>
+</file>
+
+<file path=ppt/notesSlides/notesSlide1.xml><?xml version="1.0" encoding="utf-8"?>
+<p:notes xmlns:a="http://schemas.openxmlformats.org/drawingml/2006/main" xmlns:r="http://schemas.openxmlformats.org/officeDocument/2006/relationships" xmlns:p="http://schemas.openxmlformats.org/presentationml/2006/main">
+  <p:cSld>
+    <p:spTree>
+      <p:nvGrpSpPr>
+        <p:cNvPr id="1" name=""/>
+        <p:cNvGrpSpPr/>
+        <p:nvPr/>
+      </p:nvGrpSpPr>
+      <p:grpSpPr>
+        <a:xfrm>
+          <a:off x="0" y="0"/>
+          <a:ext cx="0" cy="0"/>
+          <a:chOff x="0" y="0"/>
+          <a:chExt cx="0" cy="0"/>
+        </a:xfrm>
+      </p:grpSpPr>
+      <p:sp>
+        <p:nvSpPr>
+          <p:cNvPr id="2" name="Slide Image Placeholder 1"/>
+          <p:cNvSpPr>
+            <a:spLocks noGrp="1" noRot="1" noChangeAspect="1"/>
+          </p:cNvSpPr>
+          <p:nvPr>
+            <p:ph type="sldImg"/>
+          </p:nvPr>
+        </p:nvSpPr>
+        <p:spPr/>
+      </p:sp>
+      <p:sp>
+        <p:nvSpPr>
+          <p:cNvPr id="3" name="Notes Placeholder 2"/>
+          <p:cNvSpPr>
+            <a:spLocks noGrp="1"/>
+          </p:cNvSpPr>
+          <p:nvPr>
+            <p:ph type="body" idx="1"/>
+          </p:nvPr>
+        </p:nvSpPr>
+        <p:spPr/>
+        <p:txBody>
+          <a:bodyPr/>
+          <a:lstStyle/>
+          <a:p>
+            <a:endParaRPr lang="en-US" dirty="0"/>
+          </a:p>
+        </p:txBody>
+      </p:sp>
+      <p:sp>
+        <p:nvSpPr>
+          <p:cNvPr id="4" name="Slide Number Placeholder 3"/>
+          <p:cNvSpPr>
+            <a:spLocks noGrp="1"/>
+          </p:cNvSpPr>
+          <p:nvPr>
+            <p:ph type="sldNum" sz="quarter" idx="5"/>
+          </p:nvPr>
+        </p:nvSpPr>
+        <p:spPr/>
+        <p:txBody>
+          <a:bodyPr/>
+          <a:lstStyle/>
+          <a:p>
+            <a:fld id="{6469EE85-7B02-0A41-8298-A4EE8A600E59}" type="slidenum">
+              <a:rPr lang="en-US" smtClean="0"/>
+              <a:t>2</a:t>
+            </a:fld>
+            <a:endParaRPr lang="en-US"/>
+          </a:p>
+        </p:txBody>
+      </p:sp>
+    </p:spTree>
+    <p:extLst>
+      <p:ext uri="{BB962C8B-B14F-4D97-AF65-F5344CB8AC3E}">
+        <p14:creationId xmlns:p14="http://schemas.microsoft.com/office/powerpoint/2010/main" val="4019015876"/>
+      </p:ext>
+    </p:extLst>
+  </p:cSld>
+  <p:clrMapOvr>
+    <a:masterClrMapping/>
+  </p:clrMapOvr>
+</p:notes>
 </file>
 
 <file path=ppt/slideLayouts/slideLayout1.xml><?xml version="1.0" encoding="utf-8"?>
@@ -271,7 +707,7 @@
           <a:p>
             <a:fld id="{B073D579-9A73-FA40-8BDB-9DDC146214CA}" type="datetimeFigureOut">
               <a:rPr lang="en-US" smtClean="0"/>
-              <a:t>8/22/24</a:t>
+              <a:t>11/1/24</a:t>
             </a:fld>
             <a:endParaRPr lang="en-US"/>
           </a:p>
@@ -469,7 +905,7 @@
           <a:p>
             <a:fld id="{B073D579-9A73-FA40-8BDB-9DDC146214CA}" type="datetimeFigureOut">
               <a:rPr lang="en-US" smtClean="0"/>
-              <a:t>8/22/24</a:t>
+              <a:t>11/1/24</a:t>
             </a:fld>
             <a:endParaRPr lang="en-US"/>
           </a:p>
@@ -677,7 +1113,7 @@
           <a:p>
             <a:fld id="{B073D579-9A73-FA40-8BDB-9DDC146214CA}" type="datetimeFigureOut">
               <a:rPr lang="en-US" smtClean="0"/>
-              <a:t>8/22/24</a:t>
+              <a:t>11/1/24</a:t>
             </a:fld>
             <a:endParaRPr lang="en-US"/>
           </a:p>
@@ -875,7 +1311,7 @@
           <a:p>
             <a:fld id="{B073D579-9A73-FA40-8BDB-9DDC146214CA}" type="datetimeFigureOut">
               <a:rPr lang="en-US" smtClean="0"/>
-              <a:t>8/22/24</a:t>
+              <a:t>11/1/24</a:t>
             </a:fld>
             <a:endParaRPr lang="en-US"/>
           </a:p>
@@ -1150,7 +1586,7 @@
           <a:p>
             <a:fld id="{B073D579-9A73-FA40-8BDB-9DDC146214CA}" type="datetimeFigureOut">
               <a:rPr lang="en-US" smtClean="0"/>
-              <a:t>8/22/24</a:t>
+              <a:t>11/1/24</a:t>
             </a:fld>
             <a:endParaRPr lang="en-US"/>
           </a:p>
@@ -1415,7 +1851,7 @@
           <a:p>
             <a:fld id="{B073D579-9A73-FA40-8BDB-9DDC146214CA}" type="datetimeFigureOut">
               <a:rPr lang="en-US" smtClean="0"/>
-              <a:t>8/22/24</a:t>
+              <a:t>11/1/24</a:t>
             </a:fld>
             <a:endParaRPr lang="en-US"/>
           </a:p>
@@ -1827,7 +2263,7 @@
           <a:p>
             <a:fld id="{B073D579-9A73-FA40-8BDB-9DDC146214CA}" type="datetimeFigureOut">
               <a:rPr lang="en-US" smtClean="0"/>
-              <a:t>8/22/24</a:t>
+              <a:t>11/1/24</a:t>
             </a:fld>
             <a:endParaRPr lang="en-US"/>
           </a:p>
@@ -1968,7 +2404,7 @@
           <a:p>
             <a:fld id="{B073D579-9A73-FA40-8BDB-9DDC146214CA}" type="datetimeFigureOut">
               <a:rPr lang="en-US" smtClean="0"/>
-              <a:t>8/22/24</a:t>
+              <a:t>11/1/24</a:t>
             </a:fld>
             <a:endParaRPr lang="en-US"/>
           </a:p>
@@ -2081,7 +2517,7 @@
           <a:p>
             <a:fld id="{B073D579-9A73-FA40-8BDB-9DDC146214CA}" type="datetimeFigureOut">
               <a:rPr lang="en-US" smtClean="0"/>
-              <a:t>8/22/24</a:t>
+              <a:t>11/1/24</a:t>
             </a:fld>
             <a:endParaRPr lang="en-US"/>
           </a:p>
@@ -2392,7 +2828,7 @@
           <a:p>
             <a:fld id="{B073D579-9A73-FA40-8BDB-9DDC146214CA}" type="datetimeFigureOut">
               <a:rPr lang="en-US" smtClean="0"/>
-              <a:t>8/22/24</a:t>
+              <a:t>11/1/24</a:t>
             </a:fld>
             <a:endParaRPr lang="en-US"/>
           </a:p>
@@ -2680,7 +3116,7 @@
           <a:p>
             <a:fld id="{B073D579-9A73-FA40-8BDB-9DDC146214CA}" type="datetimeFigureOut">
               <a:rPr lang="en-US" smtClean="0"/>
-              <a:t>8/22/24</a:t>
+              <a:t>11/1/24</a:t>
             </a:fld>
             <a:endParaRPr lang="en-US"/>
           </a:p>
@@ -2921,7 +3357,7 @@
           <a:p>
             <a:fld id="{B073D579-9A73-FA40-8BDB-9DDC146214CA}" type="datetimeFigureOut">
               <a:rPr lang="en-US" smtClean="0"/>
-              <a:t>8/22/24</a:t>
+              <a:t>11/1/24</a:t>
             </a:fld>
             <a:endParaRPr lang="en-US"/>
           </a:p>
@@ -3338,66 +3774,6 @@
           <a:chExt cx="0" cy="0"/>
         </a:xfrm>
       </p:grpSpPr>
-      <p:pic>
-        <p:nvPicPr>
-          <p:cNvPr id="22" name="Picture 21">
-            <a:extLst>
-              <a:ext uri="{FF2B5EF4-FFF2-40B4-BE49-F238E27FC236}">
-                <a16:creationId xmlns:a16="http://schemas.microsoft.com/office/drawing/2014/main" id="{F2746DDB-4BC0-F4E3-1D57-AEC6AD0EA817}"/>
-              </a:ext>
-            </a:extLst>
-          </p:cNvPr>
-          <p:cNvPicPr>
-            <a:picLocks noChangeAspect="1"/>
-          </p:cNvPicPr>
-          <p:nvPr/>
-        </p:nvPicPr>
-        <p:blipFill>
-          <a:blip/>
-          <a:stretch>
-            <a:fillRect/>
-          </a:stretch>
-        </p:blipFill>
-        <p:spPr>
-          <a:xfrm>
-            <a:off x="1733347" y="3995824"/>
-            <a:ext cx="358784" cy="205019"/>
-          </a:xfrm>
-          <a:prstGeom prst="rect">
-            <a:avLst/>
-          </a:prstGeom>
-        </p:spPr>
-      </p:pic>
-      <p:pic>
-        <p:nvPicPr>
-          <p:cNvPr id="21" name="Picture 20">
-            <a:extLst>
-              <a:ext uri="{FF2B5EF4-FFF2-40B4-BE49-F238E27FC236}">
-                <a16:creationId xmlns:a16="http://schemas.microsoft.com/office/drawing/2014/main" id="{C0E54233-8880-55A6-C793-7C74D88B77EC}"/>
-              </a:ext>
-            </a:extLst>
-          </p:cNvPr>
-          <p:cNvPicPr>
-            <a:picLocks noChangeAspect="1"/>
-          </p:cNvPicPr>
-          <p:nvPr/>
-        </p:nvPicPr>
-        <p:blipFill>
-          <a:blip/>
-          <a:stretch>
-            <a:fillRect/>
-          </a:stretch>
-        </p:blipFill>
-        <p:spPr>
-          <a:xfrm>
-            <a:off x="1677403" y="2572961"/>
-            <a:ext cx="358784" cy="205019"/>
-          </a:xfrm>
-          <a:prstGeom prst="rect">
-            <a:avLst/>
-          </a:prstGeom>
-        </p:spPr>
-      </p:pic>
       <p:grpSp>
         <p:nvGrpSpPr>
           <p:cNvPr id="8" name="Group 7">
@@ -3529,42 +3905,6 @@
           </p:txBody>
         </p:sp>
       </p:grpSp>
-      <p:pic>
-        <p:nvPicPr>
-          <p:cNvPr id="12" name="Picture 11" descr="A green plant with a yellow flower&#10;&#10;Description automatically generated">
-            <a:extLst>
-              <a:ext uri="{FF2B5EF4-FFF2-40B4-BE49-F238E27FC236}">
-                <a16:creationId xmlns:a16="http://schemas.microsoft.com/office/drawing/2014/main" id="{A0DC1FAB-3F70-92CF-9C1C-25603DD41DC9}"/>
-              </a:ext>
-            </a:extLst>
-          </p:cNvPr>
-          <p:cNvPicPr>
-            <a:picLocks noChangeAspect="1"/>
-          </p:cNvPicPr>
-          <p:nvPr/>
-        </p:nvPicPr>
-        <p:blipFill>
-          <a:blip>
-            <a:extLst>
-              <a:ext uri="{837473B0-CC2E-450A-ABE3-18F120FF3D39}">
-                <a1611:picAttrSrcUrl xmlns:a1611="http://schemas.microsoft.com/office/drawing/2016/11/main" r:id="rId2"/>
-              </a:ext>
-            </a:extLst>
-          </a:blip>
-          <a:stretch>
-            <a:fillRect/>
-          </a:stretch>
-        </p:blipFill>
-        <p:spPr>
-          <a:xfrm>
-            <a:off x="936534" y="1832141"/>
-            <a:ext cx="1397000" cy="3492500"/>
-          </a:xfrm>
-          <a:prstGeom prst="rect">
-            <a:avLst/>
-          </a:prstGeom>
-        </p:spPr>
-      </p:pic>
       <p:grpSp>
         <p:nvGrpSpPr>
           <p:cNvPr id="36" name="Group 35">
@@ -3603,7 +3943,7 @@
             <a:blip>
               <a:extLst>
                 <a:ext uri="{837473B0-CC2E-450A-ABE3-18F120FF3D39}">
-                  <a1611:picAttrSrcUrl xmlns:a1611="http://schemas.microsoft.com/office/drawing/2016/11/main" r:id="rId3"/>
+                  <a1611:picAttrSrcUrl xmlns:a1611="http://schemas.microsoft.com/office/drawing/2016/11/main" r:id="rId2"/>
                 </a:ext>
               </a:extLst>
             </a:blip>
@@ -3773,7 +4113,7 @@
           <a:lstStyle/>
           <a:p>
             <a:pPr algn="ctr"/>
-            <a:endParaRPr lang="en-US"/>
+            <a:endParaRPr lang="en-US" dirty="0"/>
           </a:p>
         </p:txBody>
       </p:sp>
@@ -3792,7 +4132,7 @@
         <p:grpSpPr>
           <a:xfrm>
             <a:off x="909318" y="3083014"/>
-            <a:ext cx="1347074" cy="127317"/>
+            <a:ext cx="694692" cy="127317"/>
             <a:chOff x="7552668" y="2798967"/>
             <a:chExt cx="1347074" cy="127317"/>
           </a:xfrm>
@@ -3927,7 +4267,7 @@
         <p:grpSpPr>
           <a:xfrm>
             <a:off x="2577358" y="3082697"/>
-            <a:ext cx="1347074" cy="127317"/>
+            <a:ext cx="699242" cy="127317"/>
             <a:chOff x="7552668" y="2798967"/>
             <a:chExt cx="1347074" cy="127317"/>
           </a:xfrm>
@@ -4069,7 +4409,7 @@
         </p:blipFill>
         <p:spPr>
           <a:xfrm>
-            <a:off x="2826466" y="2935527"/>
+            <a:off x="2500150" y="2878094"/>
             <a:ext cx="853657" cy="178861"/>
           </a:xfrm>
           <a:prstGeom prst="rect">
@@ -9609,7 +9949,7 @@
             <a:blip>
               <a:extLst>
                 <a:ext uri="{837473B0-CC2E-450A-ABE3-18F120FF3D39}">
-                  <a1611:picAttrSrcUrl xmlns:a1611="http://schemas.microsoft.com/office/drawing/2016/11/main" r:id="rId2"/>
+                  <a1611:picAttrSrcUrl xmlns:a1611="http://schemas.microsoft.com/office/drawing/2016/11/main" r:id="rId3"/>
                 </a:ext>
               </a:extLst>
             </a:blip>
@@ -9939,6 +10279,51 @@
           </p:txBody>
         </p:sp>
       </p:grpSp>
+      <p:cxnSp>
+        <p:nvCxnSpPr>
+          <p:cNvPr id="2" name="Straight Connector 1">
+            <a:extLst>
+              <a:ext uri="{FF2B5EF4-FFF2-40B4-BE49-F238E27FC236}">
+                <a16:creationId xmlns:a16="http://schemas.microsoft.com/office/drawing/2014/main" id="{0F45CD84-3D5A-D685-BEA1-3C55B060ABFE}"/>
+              </a:ext>
+            </a:extLst>
+          </p:cNvPr>
+          <p:cNvCxnSpPr>
+            <a:cxnSpLocks/>
+          </p:cNvCxnSpPr>
+          <p:nvPr/>
+        </p:nvCxnSpPr>
+        <p:spPr>
+          <a:xfrm>
+            <a:off x="2734243" y="3578391"/>
+            <a:ext cx="549361" cy="397589"/>
+          </a:xfrm>
+          <a:prstGeom prst="line">
+            <a:avLst/>
+          </a:prstGeom>
+          <a:ln cap="rnd">
+            <a:solidFill>
+              <a:srgbClr val="FFFF00"/>
+            </a:solidFill>
+            <a:headEnd type="oval"/>
+            <a:tailEnd type="oval"/>
+          </a:ln>
+        </p:spPr>
+        <p:style>
+          <a:lnRef idx="2">
+            <a:schemeClr val="accent1"/>
+          </a:lnRef>
+          <a:fillRef idx="0">
+            <a:schemeClr val="accent1"/>
+          </a:fillRef>
+          <a:effectRef idx="1">
+            <a:schemeClr val="accent1"/>
+          </a:effectRef>
+          <a:fontRef idx="minor">
+            <a:schemeClr val="tx1"/>
+          </a:fontRef>
+        </p:style>
+      </p:cxnSp>
     </p:spTree>
     <p:extLst>
       <p:ext uri="{BB962C8B-B14F-4D97-AF65-F5344CB8AC3E}">
@@ -9984,13 +10369,10 @@
           <p:nvPr/>
         </p:nvPicPr>
         <p:blipFill>
-          <a:blip r:embed="rId2">
+          <a:blip>
             <a:extLst>
-              <a:ext uri="{96DAC541-7B7A-43D3-8B79-37D633B846F1}">
-                <asvg:svgBlip xmlns:asvg="http://schemas.microsoft.com/office/drawing/2016/SVG/main"/>
-              </a:ext>
               <a:ext uri="{837473B0-CC2E-450A-ABE3-18F120FF3D39}">
-                <a1611:picAttrSrcUrl xmlns:a1611="http://schemas.microsoft.com/office/drawing/2016/11/main" r:id="rId2"/>
+                <a1611:picAttrSrcUrl xmlns:a1611="http://schemas.microsoft.com/office/drawing/2016/11/main" r:id="rId3"/>
               </a:ext>
             </a:extLst>
           </a:blip>
@@ -10099,10 +10481,10 @@
       </p:sp>
       <p:grpSp>
         <p:nvGrpSpPr>
-          <p:cNvPr id="49" name="Group 48">
+          <p:cNvPr id="138" name="Group 137">
             <a:extLst>
               <a:ext uri="{FF2B5EF4-FFF2-40B4-BE49-F238E27FC236}">
-                <a16:creationId xmlns:a16="http://schemas.microsoft.com/office/drawing/2014/main" id="{6E59D965-B7A6-A536-3A16-65D72D403AFF}"/>
+                <a16:creationId xmlns:a16="http://schemas.microsoft.com/office/drawing/2014/main" id="{2F149CB3-5B1C-6B22-A8D3-4B23D3C00834}"/>
               </a:ext>
             </a:extLst>
           </p:cNvPr>
@@ -10111,251 +10493,12 @@
         </p:nvGrpSpPr>
         <p:grpSpPr>
           <a:xfrm>
-            <a:off x="5881305" y="288473"/>
-            <a:ext cx="2278088" cy="3241273"/>
-            <a:chOff x="7340587" y="668895"/>
-            <a:chExt cx="2278088" cy="3241273"/>
+            <a:off x="3704651" y="4101060"/>
+            <a:ext cx="1972413" cy="2468467"/>
+            <a:chOff x="769844" y="3574700"/>
+            <a:chExt cx="1972413" cy="2468467"/>
           </a:xfrm>
         </p:grpSpPr>
-        <p:pic>
-          <p:nvPicPr>
-            <p:cNvPr id="42" name="Picture 41">
-              <a:extLst>
-                <a:ext uri="{FF2B5EF4-FFF2-40B4-BE49-F238E27FC236}">
-                  <a16:creationId xmlns:a16="http://schemas.microsoft.com/office/drawing/2014/main" id="{0C05D8B7-E7B9-D284-5364-82B9D2015852}"/>
-                </a:ext>
-              </a:extLst>
-            </p:cNvPr>
-            <p:cNvPicPr>
-              <a:picLocks noChangeAspect="1"/>
-            </p:cNvPicPr>
-            <p:nvPr/>
-          </p:nvPicPr>
-          <p:blipFill>
-            <a:blip/>
-            <a:stretch>
-              <a:fillRect/>
-            </a:stretch>
-          </p:blipFill>
-          <p:spPr>
-            <a:xfrm>
-              <a:off x="7815781" y="1912400"/>
-              <a:ext cx="419100" cy="266700"/>
-            </a:xfrm>
-            <a:prstGeom prst="rect">
-              <a:avLst/>
-            </a:prstGeom>
-          </p:spPr>
-        </p:pic>
-        <p:grpSp>
-          <p:nvGrpSpPr>
-            <p:cNvPr id="39" name="Group 38">
-              <a:extLst>
-                <a:ext uri="{FF2B5EF4-FFF2-40B4-BE49-F238E27FC236}">
-                  <a16:creationId xmlns:a16="http://schemas.microsoft.com/office/drawing/2014/main" id="{3EB1014A-7FE2-E78B-A440-01DB6524C690}"/>
-                </a:ext>
-              </a:extLst>
-            </p:cNvPr>
-            <p:cNvGrpSpPr/>
-            <p:nvPr/>
-          </p:nvGrpSpPr>
-          <p:grpSpPr>
-            <a:xfrm>
-              <a:off x="7340587" y="668895"/>
-              <a:ext cx="979761" cy="968406"/>
-              <a:chOff x="6507779" y="906899"/>
-              <a:chExt cx="979761" cy="968406"/>
-            </a:xfrm>
-          </p:grpSpPr>
-          <p:pic>
-            <p:nvPicPr>
-              <p:cNvPr id="12" name="Graphic 11" descr="Map compass outline">
-                <a:extLst>
-                  <a:ext uri="{FF2B5EF4-FFF2-40B4-BE49-F238E27FC236}">
-                    <a16:creationId xmlns:a16="http://schemas.microsoft.com/office/drawing/2014/main" id="{2E6AD690-1EA6-BDF3-5D0B-0C22D20FCABC}"/>
-                  </a:ext>
-                </a:extLst>
-              </p:cNvPr>
-              <p:cNvPicPr>
-                <a:picLocks noChangeAspect="1"/>
-              </p:cNvPicPr>
-              <p:nvPr/>
-            </p:nvPicPr>
-            <p:blipFill>
-              <a:blip r:embed="rId6">
-                <a:extLst>
-                  <a:ext uri="{96DAC541-7B7A-43D3-8B79-37D633B846F1}">
-                    <asvg:svgBlip xmlns:asvg="http://schemas.microsoft.com/office/drawing/2016/SVG/main"/>
-                  </a:ext>
-                </a:extLst>
-              </a:blip>
-              <a:stretch>
-                <a:fillRect/>
-              </a:stretch>
-            </p:blipFill>
-            <p:spPr>
-              <a:xfrm>
-                <a:off x="6741090" y="1137837"/>
-                <a:ext cx="503381" cy="503381"/>
-              </a:xfrm>
-              <a:prstGeom prst="rect">
-                <a:avLst/>
-              </a:prstGeom>
-            </p:spPr>
-          </p:pic>
-          <p:sp>
-            <p:nvSpPr>
-              <p:cNvPr id="13" name="TextBox 12">
-                <a:extLst>
-                  <a:ext uri="{FF2B5EF4-FFF2-40B4-BE49-F238E27FC236}">
-                    <a16:creationId xmlns:a16="http://schemas.microsoft.com/office/drawing/2014/main" id="{AF7DC2DB-E18D-2D6E-F347-747EAC6B6718}"/>
-                  </a:ext>
-                </a:extLst>
-              </p:cNvPr>
-              <p:cNvSpPr txBox="1"/>
-              <p:nvPr/>
-            </p:nvSpPr>
-            <p:spPr>
-              <a:xfrm>
-                <a:off x="6838523" y="906899"/>
-                <a:ext cx="340502" cy="307777"/>
-              </a:xfrm>
-              <a:prstGeom prst="rect">
-                <a:avLst/>
-              </a:prstGeom>
-              <a:noFill/>
-            </p:spPr>
-            <p:txBody>
-              <a:bodyPr wrap="square" rtlCol="0">
-                <a:spAutoFit/>
-              </a:bodyPr>
-              <a:lstStyle/>
-              <a:p>
-                <a:r>
-                  <a:rPr lang="en-US" sz="1400" dirty="0">
-                    <a:latin typeface="Garamond" panose="02020404030301010803" pitchFamily="18" charset="0"/>
-                  </a:rPr>
-                  <a:t>N</a:t>
-                </a:r>
-              </a:p>
-            </p:txBody>
-          </p:sp>
-          <p:sp>
-            <p:nvSpPr>
-              <p:cNvPr id="14" name="TextBox 13">
-                <a:extLst>
-                  <a:ext uri="{FF2B5EF4-FFF2-40B4-BE49-F238E27FC236}">
-                    <a16:creationId xmlns:a16="http://schemas.microsoft.com/office/drawing/2014/main" id="{7401C779-AC2C-861B-DD23-2B040F48B147}"/>
-                  </a:ext>
-                </a:extLst>
-              </p:cNvPr>
-              <p:cNvSpPr txBox="1"/>
-              <p:nvPr/>
-            </p:nvSpPr>
-            <p:spPr>
-              <a:xfrm>
-                <a:off x="7147038" y="1241053"/>
-                <a:ext cx="340502" cy="307777"/>
-              </a:xfrm>
-              <a:prstGeom prst="rect">
-                <a:avLst/>
-              </a:prstGeom>
-              <a:noFill/>
-            </p:spPr>
-            <p:txBody>
-              <a:bodyPr wrap="square" rtlCol="0">
-                <a:spAutoFit/>
-              </a:bodyPr>
-              <a:lstStyle/>
-              <a:p>
-                <a:r>
-                  <a:rPr lang="en-US" sz="1400" dirty="0">
-                    <a:latin typeface="Garamond" panose="02020404030301010803" pitchFamily="18" charset="0"/>
-                  </a:rPr>
-                  <a:t>E</a:t>
-                </a:r>
-                <a:endParaRPr lang="en-US" sz="1600" dirty="0">
-                  <a:latin typeface="Garamond" panose="02020404030301010803" pitchFamily="18" charset="0"/>
-                </a:endParaRPr>
-              </a:p>
-            </p:txBody>
-          </p:sp>
-          <p:sp>
-            <p:nvSpPr>
-              <p:cNvPr id="15" name="TextBox 14">
-                <a:extLst>
-                  <a:ext uri="{FF2B5EF4-FFF2-40B4-BE49-F238E27FC236}">
-                    <a16:creationId xmlns:a16="http://schemas.microsoft.com/office/drawing/2014/main" id="{6C5C377B-FA25-0510-25A8-23B48E76A25E}"/>
-                  </a:ext>
-                </a:extLst>
-              </p:cNvPr>
-              <p:cNvSpPr txBox="1"/>
-              <p:nvPr/>
-            </p:nvSpPr>
-            <p:spPr>
-              <a:xfrm>
-                <a:off x="6818457" y="1567528"/>
-                <a:ext cx="340502" cy="307777"/>
-              </a:xfrm>
-              <a:prstGeom prst="rect">
-                <a:avLst/>
-              </a:prstGeom>
-              <a:noFill/>
-            </p:spPr>
-            <p:txBody>
-              <a:bodyPr wrap="square" rtlCol="0">
-                <a:spAutoFit/>
-              </a:bodyPr>
-              <a:lstStyle/>
-              <a:p>
-                <a:pPr algn="ctr"/>
-                <a:r>
-                  <a:rPr lang="en-US" sz="1400" dirty="0">
-                    <a:latin typeface="Garamond" panose="02020404030301010803" pitchFamily="18" charset="0"/>
-                  </a:rPr>
-                  <a:t>S</a:t>
-                </a:r>
-              </a:p>
-            </p:txBody>
-          </p:sp>
-          <p:sp>
-            <p:nvSpPr>
-              <p:cNvPr id="16" name="TextBox 15">
-                <a:extLst>
-                  <a:ext uri="{FF2B5EF4-FFF2-40B4-BE49-F238E27FC236}">
-                    <a16:creationId xmlns:a16="http://schemas.microsoft.com/office/drawing/2014/main" id="{DFD568DC-0B11-6210-97DE-34AA9A3CF074}"/>
-                  </a:ext>
-                </a:extLst>
-              </p:cNvPr>
-              <p:cNvSpPr txBox="1"/>
-              <p:nvPr/>
-            </p:nvSpPr>
-            <p:spPr>
-              <a:xfrm>
-                <a:off x="6507779" y="1241053"/>
-                <a:ext cx="340502" cy="307777"/>
-              </a:xfrm>
-              <a:prstGeom prst="rect">
-                <a:avLst/>
-              </a:prstGeom>
-              <a:noFill/>
-            </p:spPr>
-            <p:txBody>
-              <a:bodyPr wrap="square" rtlCol="0">
-                <a:spAutoFit/>
-              </a:bodyPr>
-              <a:lstStyle/>
-              <a:p>
-                <a:r>
-                  <a:rPr lang="en-US" sz="1400" dirty="0">
-                    <a:latin typeface="Garamond" panose="02020404030301010803" pitchFamily="18" charset="0"/>
-                  </a:rPr>
-                  <a:t>W</a:t>
-                </a:r>
-              </a:p>
-            </p:txBody>
-          </p:sp>
-        </p:grpSp>
         <p:grpSp>
           <p:nvGrpSpPr>
             <p:cNvPr id="32" name="Group 31">
@@ -10370,7 +10513,7 @@
           </p:nvGrpSpPr>
           <p:grpSpPr>
             <a:xfrm>
-              <a:off x="7971666" y="1893880"/>
+              <a:off x="1095248" y="4026879"/>
               <a:ext cx="1641656" cy="1770172"/>
               <a:chOff x="7971666" y="1893880"/>
               <a:chExt cx="1641656" cy="1770172"/>
@@ -10967,7 +11110,7 @@
           </p:nvCxnSpPr>
           <p:spPr>
             <a:xfrm rot="2100000" flipV="1">
-              <a:off x="8193297" y="1557795"/>
+              <a:off x="1316879" y="3690794"/>
               <a:ext cx="0" cy="1280160"/>
             </a:xfrm>
             <a:prstGeom prst="straightConnector1">
@@ -11011,7 +11154,7 @@
           </p:nvCxnSpPr>
           <p:spPr>
             <a:xfrm rot="7500000" flipV="1">
-              <a:off x="8606382" y="2311737"/>
+              <a:off x="1729964" y="4444736"/>
               <a:ext cx="0" cy="1920240"/>
             </a:xfrm>
             <a:prstGeom prst="straightConnector1">
@@ -11039,100 +11182,6 @@
             </a:fontRef>
           </p:style>
         </p:cxnSp>
-        <p:cxnSp>
-          <p:nvCxnSpPr>
-            <p:cNvPr id="37" name="Straight Connector 36">
-              <a:extLst>
-                <a:ext uri="{FF2B5EF4-FFF2-40B4-BE49-F238E27FC236}">
-                  <a16:creationId xmlns:a16="http://schemas.microsoft.com/office/drawing/2014/main" id="{9E7A473D-A723-464E-832D-1A7C7CF9215F}"/>
-                </a:ext>
-              </a:extLst>
-            </p:cNvPr>
-            <p:cNvCxnSpPr>
-              <a:cxnSpLocks/>
-            </p:cNvCxnSpPr>
-            <p:nvPr/>
-          </p:nvCxnSpPr>
-          <p:spPr>
-            <a:xfrm>
-              <a:off x="7819897" y="1641218"/>
-              <a:ext cx="0" cy="2181342"/>
-            </a:xfrm>
-            <a:prstGeom prst="line">
-              <a:avLst/>
-            </a:prstGeom>
-            <a:ln>
-              <a:solidFill>
-                <a:schemeClr val="tx1"/>
-              </a:solidFill>
-              <a:prstDash val="sysDash"/>
-            </a:ln>
-          </p:spPr>
-          <p:style>
-            <a:lnRef idx="2">
-              <a:schemeClr val="accent1"/>
-            </a:lnRef>
-            <a:fillRef idx="0">
-              <a:schemeClr val="accent1"/>
-            </a:fillRef>
-            <a:effectRef idx="1">
-              <a:schemeClr val="accent1"/>
-            </a:effectRef>
-            <a:fontRef idx="minor">
-              <a:schemeClr val="tx1"/>
-            </a:fontRef>
-          </p:style>
-        </p:cxnSp>
-        <p:sp>
-          <p:nvSpPr>
-            <p:cNvPr id="40" name="Arc 39">
-              <a:extLst>
-                <a:ext uri="{FF2B5EF4-FFF2-40B4-BE49-F238E27FC236}">
-                  <a16:creationId xmlns:a16="http://schemas.microsoft.com/office/drawing/2014/main" id="{B0337622-760C-0366-A079-334EF1D13B87}"/>
-                </a:ext>
-              </a:extLst>
-            </p:cNvPr>
-            <p:cNvSpPr/>
-            <p:nvPr/>
-          </p:nvSpPr>
-          <p:spPr>
-            <a:xfrm>
-              <a:off x="7603233" y="2450816"/>
-              <a:ext cx="457200" cy="457200"/>
-            </a:xfrm>
-            <a:prstGeom prst="arc">
-              <a:avLst>
-                <a:gd name="adj1" fmla="val 16200000"/>
-                <a:gd name="adj2" fmla="val 18489326"/>
-              </a:avLst>
-            </a:prstGeom>
-            <a:solidFill>
-              <a:srgbClr val="FFFF00"/>
-            </a:solidFill>
-          </p:spPr>
-          <p:style>
-            <a:lnRef idx="2">
-              <a:schemeClr val="accent1"/>
-            </a:lnRef>
-            <a:fillRef idx="0">
-              <a:schemeClr val="accent1"/>
-            </a:fillRef>
-            <a:effectRef idx="1">
-              <a:schemeClr val="accent1"/>
-            </a:effectRef>
-            <a:fontRef idx="minor">
-              <a:schemeClr val="tx1"/>
-            </a:fontRef>
-          </p:style>
-          <p:txBody>
-            <a:bodyPr rtlCol="0" anchor="ctr"/>
-            <a:lstStyle/>
-            <a:p>
-              <a:pPr algn="ctr"/>
-              <a:endParaRPr lang="en-US"/>
-            </a:p>
-          </p:txBody>
-        </p:sp>
         <p:sp>
           <p:nvSpPr>
             <p:cNvPr id="44" name="TextBox 43">
@@ -11147,7 +11196,7 @@
           </p:nvSpPr>
           <p:spPr>
             <a:xfrm>
-              <a:off x="9353859" y="3602391"/>
+              <a:off x="2477441" y="5735390"/>
               <a:ext cx="264816" cy="307777"/>
             </a:xfrm>
             <a:prstGeom prst="rect">
@@ -11184,7 +11233,7 @@
           </p:nvSpPr>
           <p:spPr>
             <a:xfrm>
-              <a:off x="8525732" y="1441701"/>
+              <a:off x="1649314" y="3574700"/>
               <a:ext cx="260008" cy="307777"/>
             </a:xfrm>
             <a:prstGeom prst="rect">
@@ -11203,45 +11252,6 @@
                   <a:latin typeface="Garamond" panose="02020404030301010803" pitchFamily="18" charset="0"/>
                 </a:rPr>
                 <a:t>y</a:t>
-              </a:r>
-            </a:p>
-          </p:txBody>
-        </p:sp>
-        <p:sp>
-          <p:nvSpPr>
-            <p:cNvPr id="46" name="TextBox 45">
-              <a:extLst>
-                <a:ext uri="{FF2B5EF4-FFF2-40B4-BE49-F238E27FC236}">
-                  <a16:creationId xmlns:a16="http://schemas.microsoft.com/office/drawing/2014/main" id="{F284B71B-AF98-04B8-FC99-1496DAEA1B33}"/>
-                </a:ext>
-              </a:extLst>
-            </p:cNvPr>
-            <p:cNvSpPr txBox="1"/>
-            <p:nvPr/>
-          </p:nvSpPr>
-          <p:spPr>
-            <a:xfrm>
-              <a:off x="8492934" y="2623336"/>
-              <a:ext cx="519951" cy="307777"/>
-            </a:xfrm>
-            <a:prstGeom prst="rect">
-              <a:avLst/>
-            </a:prstGeom>
-            <a:solidFill>
-              <a:srgbClr val="92D050"/>
-            </a:solidFill>
-          </p:spPr>
-          <p:txBody>
-            <a:bodyPr wrap="none" rtlCol="0">
-              <a:spAutoFit/>
-            </a:bodyPr>
-            <a:lstStyle/>
-            <a:p>
-              <a:r>
-                <a:rPr lang="en-US" sz="1400" dirty="0">
-                  <a:latin typeface="Garamond" panose="02020404030301010803" pitchFamily="18" charset="0"/>
-                </a:rPr>
-                <a:t>farm</a:t>
               </a:r>
             </a:p>
           </p:txBody>
@@ -12005,7 +12015,7 @@
             <a:blip>
               <a:extLst>
                 <a:ext uri="{837473B0-CC2E-450A-ABE3-18F120FF3D39}">
-                  <a1611:picAttrSrcUrl xmlns:a1611="http://schemas.microsoft.com/office/drawing/2016/11/main" r:id="rId3"/>
+                  <a1611:picAttrSrcUrl xmlns:a1611="http://schemas.microsoft.com/office/drawing/2016/11/main" r:id="rId4"/>
                 </a:ext>
               </a:extLst>
             </a:blip>
@@ -13406,6 +13416,1608 @@
           </a:p>
         </p:txBody>
       </p:sp>
+      <p:grpSp>
+        <p:nvGrpSpPr>
+          <p:cNvPr id="96" name="Group 95">
+            <a:extLst>
+              <a:ext uri="{FF2B5EF4-FFF2-40B4-BE49-F238E27FC236}">
+                <a16:creationId xmlns:a16="http://schemas.microsoft.com/office/drawing/2014/main" id="{F8FF9795-5E22-E3E9-FE6C-CDAD04A99E66}"/>
+              </a:ext>
+            </a:extLst>
+          </p:cNvPr>
+          <p:cNvGrpSpPr/>
+          <p:nvPr/>
+        </p:nvGrpSpPr>
+        <p:grpSpPr>
+          <a:xfrm>
+            <a:off x="5140934" y="4217989"/>
+            <a:ext cx="979761" cy="968406"/>
+            <a:chOff x="3324175" y="3323379"/>
+            <a:chExt cx="979761" cy="968406"/>
+          </a:xfrm>
+        </p:grpSpPr>
+        <p:sp>
+          <p:nvSpPr>
+            <p:cNvPr id="84" name="TextBox 83">
+              <a:extLst>
+                <a:ext uri="{FF2B5EF4-FFF2-40B4-BE49-F238E27FC236}">
+                  <a16:creationId xmlns:a16="http://schemas.microsoft.com/office/drawing/2014/main" id="{C4E8BDDE-7EE4-4172-1990-93FC4A28F202}"/>
+                </a:ext>
+              </a:extLst>
+            </p:cNvPr>
+            <p:cNvSpPr txBox="1"/>
+            <p:nvPr/>
+          </p:nvSpPr>
+          <p:spPr>
+            <a:xfrm>
+              <a:off x="3654919" y="3323379"/>
+              <a:ext cx="340502" cy="307777"/>
+            </a:xfrm>
+            <a:prstGeom prst="rect">
+              <a:avLst/>
+            </a:prstGeom>
+            <a:noFill/>
+          </p:spPr>
+          <p:txBody>
+            <a:bodyPr wrap="square" rtlCol="0">
+              <a:spAutoFit/>
+            </a:bodyPr>
+            <a:lstStyle/>
+            <a:p>
+              <a:r>
+                <a:rPr lang="en-US" sz="1400" dirty="0">
+                  <a:latin typeface="Garamond" panose="02020404030301010803" pitchFamily="18" charset="0"/>
+                </a:rPr>
+                <a:t>N</a:t>
+              </a:r>
+            </a:p>
+          </p:txBody>
+        </p:sp>
+        <p:sp>
+          <p:nvSpPr>
+            <p:cNvPr id="86" name="TextBox 85">
+              <a:extLst>
+                <a:ext uri="{FF2B5EF4-FFF2-40B4-BE49-F238E27FC236}">
+                  <a16:creationId xmlns:a16="http://schemas.microsoft.com/office/drawing/2014/main" id="{A7E7F19D-FDA0-3B72-4F6A-06D1930580E0}"/>
+                </a:ext>
+              </a:extLst>
+            </p:cNvPr>
+            <p:cNvSpPr txBox="1"/>
+            <p:nvPr/>
+          </p:nvSpPr>
+          <p:spPr>
+            <a:xfrm>
+              <a:off x="3963434" y="3657533"/>
+              <a:ext cx="340502" cy="307777"/>
+            </a:xfrm>
+            <a:prstGeom prst="rect">
+              <a:avLst/>
+            </a:prstGeom>
+            <a:noFill/>
+          </p:spPr>
+          <p:txBody>
+            <a:bodyPr wrap="square" rtlCol="0">
+              <a:spAutoFit/>
+            </a:bodyPr>
+            <a:lstStyle/>
+            <a:p>
+              <a:r>
+                <a:rPr lang="en-US" sz="1400" dirty="0">
+                  <a:latin typeface="Garamond" panose="02020404030301010803" pitchFamily="18" charset="0"/>
+                </a:rPr>
+                <a:t>E</a:t>
+              </a:r>
+              <a:endParaRPr lang="en-US" sz="1600" dirty="0">
+                <a:latin typeface="Garamond" panose="02020404030301010803" pitchFamily="18" charset="0"/>
+              </a:endParaRPr>
+            </a:p>
+          </p:txBody>
+        </p:sp>
+        <p:sp>
+          <p:nvSpPr>
+            <p:cNvPr id="87" name="TextBox 86">
+              <a:extLst>
+                <a:ext uri="{FF2B5EF4-FFF2-40B4-BE49-F238E27FC236}">
+                  <a16:creationId xmlns:a16="http://schemas.microsoft.com/office/drawing/2014/main" id="{D36BC17F-D17B-9D07-895F-2CD39AFF301C}"/>
+                </a:ext>
+              </a:extLst>
+            </p:cNvPr>
+            <p:cNvSpPr txBox="1"/>
+            <p:nvPr/>
+          </p:nvSpPr>
+          <p:spPr>
+            <a:xfrm>
+              <a:off x="3634853" y="3984008"/>
+              <a:ext cx="340502" cy="307777"/>
+            </a:xfrm>
+            <a:prstGeom prst="rect">
+              <a:avLst/>
+            </a:prstGeom>
+            <a:noFill/>
+          </p:spPr>
+          <p:txBody>
+            <a:bodyPr wrap="square" rtlCol="0">
+              <a:spAutoFit/>
+            </a:bodyPr>
+            <a:lstStyle/>
+            <a:p>
+              <a:pPr algn="ctr"/>
+              <a:r>
+                <a:rPr lang="en-US" sz="1400" dirty="0">
+                  <a:latin typeface="Garamond" panose="02020404030301010803" pitchFamily="18" charset="0"/>
+                </a:rPr>
+                <a:t>S</a:t>
+              </a:r>
+            </a:p>
+          </p:txBody>
+        </p:sp>
+        <p:sp>
+          <p:nvSpPr>
+            <p:cNvPr id="89" name="TextBox 88">
+              <a:extLst>
+                <a:ext uri="{FF2B5EF4-FFF2-40B4-BE49-F238E27FC236}">
+                  <a16:creationId xmlns:a16="http://schemas.microsoft.com/office/drawing/2014/main" id="{328A0662-EC7C-5B17-56E7-09C01CD33C01}"/>
+                </a:ext>
+              </a:extLst>
+            </p:cNvPr>
+            <p:cNvSpPr txBox="1"/>
+            <p:nvPr/>
+          </p:nvSpPr>
+          <p:spPr>
+            <a:xfrm>
+              <a:off x="3324175" y="3657533"/>
+              <a:ext cx="340502" cy="307777"/>
+            </a:xfrm>
+            <a:prstGeom prst="rect">
+              <a:avLst/>
+            </a:prstGeom>
+            <a:noFill/>
+          </p:spPr>
+          <p:txBody>
+            <a:bodyPr wrap="square" rtlCol="0">
+              <a:spAutoFit/>
+            </a:bodyPr>
+            <a:lstStyle/>
+            <a:p>
+              <a:r>
+                <a:rPr lang="en-US" sz="1400" dirty="0">
+                  <a:latin typeface="Garamond" panose="02020404030301010803" pitchFamily="18" charset="0"/>
+                </a:rPr>
+                <a:t>W</a:t>
+              </a:r>
+            </a:p>
+          </p:txBody>
+        </p:sp>
+        <p:pic>
+          <p:nvPicPr>
+            <p:cNvPr id="95" name="Graphic 94" descr="Map compass outline">
+              <a:extLst>
+                <a:ext uri="{FF2B5EF4-FFF2-40B4-BE49-F238E27FC236}">
+                  <a16:creationId xmlns:a16="http://schemas.microsoft.com/office/drawing/2014/main" id="{CDAE9D22-0FBE-4E8B-15FF-6D1340A1525E}"/>
+                </a:ext>
+              </a:extLst>
+            </p:cNvPr>
+            <p:cNvPicPr>
+              <a:picLocks noChangeAspect="1"/>
+            </p:cNvPicPr>
+            <p:nvPr/>
+          </p:nvPicPr>
+          <p:blipFill>
+            <a:blip r:embed="rId5">
+              <a:extLst>
+                <a:ext uri="{96DAC541-7B7A-43D3-8B79-37D633B846F1}">
+                  <asvg:svgBlip xmlns:asvg="http://schemas.microsoft.com/office/drawing/2016/SVG/main" r:embed="rId6"/>
+                </a:ext>
+              </a:extLst>
+            </a:blip>
+            <a:stretch>
+              <a:fillRect/>
+            </a:stretch>
+          </p:blipFill>
+          <p:spPr>
+            <a:xfrm>
+              <a:off x="3520950" y="3505970"/>
+              <a:ext cx="577600" cy="577600"/>
+            </a:xfrm>
+            <a:prstGeom prst="rect">
+              <a:avLst/>
+            </a:prstGeom>
+          </p:spPr>
+        </p:pic>
+      </p:grpSp>
+      <p:grpSp>
+        <p:nvGrpSpPr>
+          <p:cNvPr id="110" name="Group 109">
+            <a:extLst>
+              <a:ext uri="{FF2B5EF4-FFF2-40B4-BE49-F238E27FC236}">
+                <a16:creationId xmlns:a16="http://schemas.microsoft.com/office/drawing/2014/main" id="{72C118EE-D56B-BA88-9535-FD0576360A6D}"/>
+              </a:ext>
+            </a:extLst>
+          </p:cNvPr>
+          <p:cNvGrpSpPr/>
+          <p:nvPr/>
+        </p:nvGrpSpPr>
+        <p:grpSpPr>
+          <a:xfrm>
+            <a:off x="6033705" y="440873"/>
+            <a:ext cx="2278088" cy="3241273"/>
+            <a:chOff x="7340587" y="668895"/>
+            <a:chExt cx="2278088" cy="3241273"/>
+          </a:xfrm>
+        </p:grpSpPr>
+        <p:pic>
+          <p:nvPicPr>
+            <p:cNvPr id="112" name="Picture 111">
+              <a:extLst>
+                <a:ext uri="{FF2B5EF4-FFF2-40B4-BE49-F238E27FC236}">
+                  <a16:creationId xmlns:a16="http://schemas.microsoft.com/office/drawing/2014/main" id="{FD7C3B71-B9B1-EDD3-6ED8-51C665993B2F}"/>
+                </a:ext>
+              </a:extLst>
+            </p:cNvPr>
+            <p:cNvPicPr>
+              <a:picLocks noChangeAspect="1"/>
+            </p:cNvPicPr>
+            <p:nvPr/>
+          </p:nvPicPr>
+          <p:blipFill>
+            <a:blip/>
+            <a:stretch>
+              <a:fillRect/>
+            </a:stretch>
+          </p:blipFill>
+          <p:spPr>
+            <a:xfrm>
+              <a:off x="7815781" y="1912400"/>
+              <a:ext cx="419100" cy="266700"/>
+            </a:xfrm>
+            <a:prstGeom prst="rect">
+              <a:avLst/>
+            </a:prstGeom>
+          </p:spPr>
+        </p:pic>
+        <p:grpSp>
+          <p:nvGrpSpPr>
+            <p:cNvPr id="113" name="Group 112">
+              <a:extLst>
+                <a:ext uri="{FF2B5EF4-FFF2-40B4-BE49-F238E27FC236}">
+                  <a16:creationId xmlns:a16="http://schemas.microsoft.com/office/drawing/2014/main" id="{0B23CA65-48B8-436B-E7FA-2851DCAC9E23}"/>
+                </a:ext>
+              </a:extLst>
+            </p:cNvPr>
+            <p:cNvGrpSpPr/>
+            <p:nvPr/>
+          </p:nvGrpSpPr>
+          <p:grpSpPr>
+            <a:xfrm>
+              <a:off x="7340587" y="668895"/>
+              <a:ext cx="979761" cy="968406"/>
+              <a:chOff x="6507779" y="906899"/>
+              <a:chExt cx="979761" cy="968406"/>
+            </a:xfrm>
+          </p:grpSpPr>
+          <p:pic>
+            <p:nvPicPr>
+              <p:cNvPr id="133" name="Graphic 11" descr="Map compass outline">
+                <a:extLst>
+                  <a:ext uri="{FF2B5EF4-FFF2-40B4-BE49-F238E27FC236}">
+                    <a16:creationId xmlns:a16="http://schemas.microsoft.com/office/drawing/2014/main" id="{F872AF71-FCF9-915E-85EA-384AD3BA8288}"/>
+                  </a:ext>
+                </a:extLst>
+              </p:cNvPr>
+              <p:cNvPicPr>
+                <a:picLocks noChangeAspect="1"/>
+              </p:cNvPicPr>
+              <p:nvPr/>
+            </p:nvPicPr>
+            <p:blipFill>
+              <a:blip/>
+              <a:stretch>
+                <a:fillRect/>
+              </a:stretch>
+            </p:blipFill>
+            <p:spPr>
+              <a:xfrm>
+                <a:off x="6741090" y="1137837"/>
+                <a:ext cx="503381" cy="503381"/>
+              </a:xfrm>
+              <a:prstGeom prst="rect">
+                <a:avLst/>
+              </a:prstGeom>
+            </p:spPr>
+          </p:pic>
+          <p:sp>
+            <p:nvSpPr>
+              <p:cNvPr id="134" name="TextBox 133">
+                <a:extLst>
+                  <a:ext uri="{FF2B5EF4-FFF2-40B4-BE49-F238E27FC236}">
+                    <a16:creationId xmlns:a16="http://schemas.microsoft.com/office/drawing/2014/main" id="{E2C86912-D863-65BC-EBE1-984B84D06474}"/>
+                  </a:ext>
+                </a:extLst>
+              </p:cNvPr>
+              <p:cNvSpPr txBox="1"/>
+              <p:nvPr/>
+            </p:nvSpPr>
+            <p:spPr>
+              <a:xfrm>
+                <a:off x="6838523" y="906899"/>
+                <a:ext cx="340502" cy="307777"/>
+              </a:xfrm>
+              <a:prstGeom prst="rect">
+                <a:avLst/>
+              </a:prstGeom>
+              <a:noFill/>
+            </p:spPr>
+            <p:txBody>
+              <a:bodyPr wrap="square" rtlCol="0">
+                <a:spAutoFit/>
+              </a:bodyPr>
+              <a:lstStyle/>
+              <a:p>
+                <a:r>
+                  <a:rPr lang="en-US" sz="1400" dirty="0">
+                    <a:latin typeface="Garamond" panose="02020404030301010803" pitchFamily="18" charset="0"/>
+                  </a:rPr>
+                  <a:t>N</a:t>
+                </a:r>
+              </a:p>
+            </p:txBody>
+          </p:sp>
+          <p:sp>
+            <p:nvSpPr>
+              <p:cNvPr id="135" name="TextBox 134">
+                <a:extLst>
+                  <a:ext uri="{FF2B5EF4-FFF2-40B4-BE49-F238E27FC236}">
+                    <a16:creationId xmlns:a16="http://schemas.microsoft.com/office/drawing/2014/main" id="{0F5C0B1F-84E6-8956-8DA3-83323594C448}"/>
+                  </a:ext>
+                </a:extLst>
+              </p:cNvPr>
+              <p:cNvSpPr txBox="1"/>
+              <p:nvPr/>
+            </p:nvSpPr>
+            <p:spPr>
+              <a:xfrm>
+                <a:off x="7147038" y="1241053"/>
+                <a:ext cx="340502" cy="307777"/>
+              </a:xfrm>
+              <a:prstGeom prst="rect">
+                <a:avLst/>
+              </a:prstGeom>
+              <a:noFill/>
+            </p:spPr>
+            <p:txBody>
+              <a:bodyPr wrap="square" rtlCol="0">
+                <a:spAutoFit/>
+              </a:bodyPr>
+              <a:lstStyle/>
+              <a:p>
+                <a:r>
+                  <a:rPr lang="en-US" sz="1400" dirty="0">
+                    <a:latin typeface="Garamond" panose="02020404030301010803" pitchFamily="18" charset="0"/>
+                  </a:rPr>
+                  <a:t>E</a:t>
+                </a:r>
+                <a:endParaRPr lang="en-US" sz="1600" dirty="0">
+                  <a:latin typeface="Garamond" panose="02020404030301010803" pitchFamily="18" charset="0"/>
+                </a:endParaRPr>
+              </a:p>
+            </p:txBody>
+          </p:sp>
+          <p:sp>
+            <p:nvSpPr>
+              <p:cNvPr id="136" name="TextBox 135">
+                <a:extLst>
+                  <a:ext uri="{FF2B5EF4-FFF2-40B4-BE49-F238E27FC236}">
+                    <a16:creationId xmlns:a16="http://schemas.microsoft.com/office/drawing/2014/main" id="{9D2904CD-3A9A-2C99-15F9-37DC5591FEF8}"/>
+                  </a:ext>
+                </a:extLst>
+              </p:cNvPr>
+              <p:cNvSpPr txBox="1"/>
+              <p:nvPr/>
+            </p:nvSpPr>
+            <p:spPr>
+              <a:xfrm>
+                <a:off x="6818457" y="1567528"/>
+                <a:ext cx="340502" cy="307777"/>
+              </a:xfrm>
+              <a:prstGeom prst="rect">
+                <a:avLst/>
+              </a:prstGeom>
+              <a:noFill/>
+            </p:spPr>
+            <p:txBody>
+              <a:bodyPr wrap="square" rtlCol="0">
+                <a:spAutoFit/>
+              </a:bodyPr>
+              <a:lstStyle/>
+              <a:p>
+                <a:pPr algn="ctr"/>
+                <a:r>
+                  <a:rPr lang="en-US" sz="1400" dirty="0">
+                    <a:latin typeface="Garamond" panose="02020404030301010803" pitchFamily="18" charset="0"/>
+                  </a:rPr>
+                  <a:t>S</a:t>
+                </a:r>
+              </a:p>
+            </p:txBody>
+          </p:sp>
+          <p:sp>
+            <p:nvSpPr>
+              <p:cNvPr id="137" name="TextBox 136">
+                <a:extLst>
+                  <a:ext uri="{FF2B5EF4-FFF2-40B4-BE49-F238E27FC236}">
+                    <a16:creationId xmlns:a16="http://schemas.microsoft.com/office/drawing/2014/main" id="{5A1DCC67-9F50-2C22-0EA0-C9811C85A812}"/>
+                  </a:ext>
+                </a:extLst>
+              </p:cNvPr>
+              <p:cNvSpPr txBox="1"/>
+              <p:nvPr/>
+            </p:nvSpPr>
+            <p:spPr>
+              <a:xfrm>
+                <a:off x="6507779" y="1241053"/>
+                <a:ext cx="340502" cy="307777"/>
+              </a:xfrm>
+              <a:prstGeom prst="rect">
+                <a:avLst/>
+              </a:prstGeom>
+              <a:noFill/>
+            </p:spPr>
+            <p:txBody>
+              <a:bodyPr wrap="square" rtlCol="0">
+                <a:spAutoFit/>
+              </a:bodyPr>
+              <a:lstStyle/>
+              <a:p>
+                <a:r>
+                  <a:rPr lang="en-US" sz="1400" dirty="0">
+                    <a:latin typeface="Garamond" panose="02020404030301010803" pitchFamily="18" charset="0"/>
+                  </a:rPr>
+                  <a:t>W</a:t>
+                </a:r>
+              </a:p>
+            </p:txBody>
+          </p:sp>
+        </p:grpSp>
+        <p:grpSp>
+          <p:nvGrpSpPr>
+            <p:cNvPr id="114" name="Group 113">
+              <a:extLst>
+                <a:ext uri="{FF2B5EF4-FFF2-40B4-BE49-F238E27FC236}">
+                  <a16:creationId xmlns:a16="http://schemas.microsoft.com/office/drawing/2014/main" id="{BD965A5B-1B2E-7CC2-AAB2-E0A4206A4BA2}"/>
+                </a:ext>
+              </a:extLst>
+            </p:cNvPr>
+            <p:cNvGrpSpPr/>
+            <p:nvPr/>
+          </p:nvGrpSpPr>
+          <p:grpSpPr>
+            <a:xfrm>
+              <a:off x="7971666" y="1893880"/>
+              <a:ext cx="1641656" cy="1770172"/>
+              <a:chOff x="7971666" y="1893880"/>
+              <a:chExt cx="1641656" cy="1770172"/>
+            </a:xfrm>
+          </p:grpSpPr>
+          <p:sp>
+            <p:nvSpPr>
+              <p:cNvPr id="122" name="Rectangle 121">
+                <a:extLst>
+                  <a:ext uri="{FF2B5EF4-FFF2-40B4-BE49-F238E27FC236}">
+                    <a16:creationId xmlns:a16="http://schemas.microsoft.com/office/drawing/2014/main" id="{1CAABF9B-7F5B-6B45-1B79-501B208F2A21}"/>
+                  </a:ext>
+                </a:extLst>
+              </p:cNvPr>
+              <p:cNvSpPr/>
+              <p:nvPr/>
+            </p:nvSpPr>
+            <p:spPr>
+              <a:xfrm rot="2081700">
+                <a:off x="7971666" y="2275147"/>
+                <a:ext cx="1641656" cy="1008931"/>
+              </a:xfrm>
+              <a:prstGeom prst="rect">
+                <a:avLst/>
+              </a:prstGeom>
+              <a:solidFill>
+                <a:srgbClr val="92D050"/>
+              </a:solidFill>
+              <a:ln>
+                <a:solidFill>
+                  <a:schemeClr val="tx1"/>
+                </a:solidFill>
+              </a:ln>
+            </p:spPr>
+            <p:style>
+              <a:lnRef idx="2">
+                <a:schemeClr val="accent1">
+                  <a:shade val="15000"/>
+                </a:schemeClr>
+              </a:lnRef>
+              <a:fillRef idx="1">
+                <a:schemeClr val="accent1"/>
+              </a:fillRef>
+              <a:effectRef idx="0">
+                <a:schemeClr val="accent1"/>
+              </a:effectRef>
+              <a:fontRef idx="minor">
+                <a:schemeClr val="lt1"/>
+              </a:fontRef>
+            </p:style>
+            <p:txBody>
+              <a:bodyPr rtlCol="0" anchor="ctr"/>
+              <a:lstStyle/>
+              <a:p>
+                <a:pPr algn="ctr"/>
+                <a:endParaRPr lang="en-US"/>
+              </a:p>
+            </p:txBody>
+          </p:sp>
+          <p:sp>
+            <p:nvSpPr>
+              <p:cNvPr id="123" name="Rectangle 122">
+                <a:extLst>
+                  <a:ext uri="{FF2B5EF4-FFF2-40B4-BE49-F238E27FC236}">
+                    <a16:creationId xmlns:a16="http://schemas.microsoft.com/office/drawing/2014/main" id="{F8A9F5FE-EC8F-3143-5724-4A838734B4E5}"/>
+                  </a:ext>
+                </a:extLst>
+              </p:cNvPr>
+              <p:cNvSpPr/>
+              <p:nvPr/>
+            </p:nvSpPr>
+            <p:spPr>
+              <a:xfrm rot="2100000">
+                <a:off x="8186525" y="1893880"/>
+                <a:ext cx="66583" cy="994150"/>
+              </a:xfrm>
+              <a:prstGeom prst="rect">
+                <a:avLst/>
+              </a:prstGeom>
+              <a:solidFill>
+                <a:schemeClr val="accent6"/>
+              </a:solidFill>
+              <a:ln>
+                <a:noFill/>
+              </a:ln>
+            </p:spPr>
+            <p:style>
+              <a:lnRef idx="2">
+                <a:schemeClr val="accent1">
+                  <a:shade val="15000"/>
+                </a:schemeClr>
+              </a:lnRef>
+              <a:fillRef idx="1">
+                <a:schemeClr val="accent1"/>
+              </a:fillRef>
+              <a:effectRef idx="0">
+                <a:schemeClr val="accent1"/>
+              </a:effectRef>
+              <a:fontRef idx="minor">
+                <a:schemeClr val="lt1"/>
+              </a:fontRef>
+            </p:style>
+            <p:txBody>
+              <a:bodyPr rtlCol="0" anchor="ctr"/>
+              <a:lstStyle/>
+              <a:p>
+                <a:pPr algn="ctr"/>
+                <a:endParaRPr lang="en-US"/>
+              </a:p>
+            </p:txBody>
+          </p:sp>
+          <p:sp>
+            <p:nvSpPr>
+              <p:cNvPr id="124" name="Rectangle 123">
+                <a:extLst>
+                  <a:ext uri="{FF2B5EF4-FFF2-40B4-BE49-F238E27FC236}">
+                    <a16:creationId xmlns:a16="http://schemas.microsoft.com/office/drawing/2014/main" id="{7A9A9759-ACA3-D749-7ECD-58FD0782E686}"/>
+                  </a:ext>
+                </a:extLst>
+              </p:cNvPr>
+              <p:cNvSpPr/>
+              <p:nvPr/>
+            </p:nvSpPr>
+            <p:spPr>
+              <a:xfrm rot="2100000">
+                <a:off x="8313872" y="1976909"/>
+                <a:ext cx="66583" cy="994150"/>
+              </a:xfrm>
+              <a:prstGeom prst="rect">
+                <a:avLst/>
+              </a:prstGeom>
+              <a:solidFill>
+                <a:schemeClr val="accent6"/>
+              </a:solidFill>
+              <a:ln>
+                <a:noFill/>
+              </a:ln>
+            </p:spPr>
+            <p:style>
+              <a:lnRef idx="2">
+                <a:schemeClr val="accent1">
+                  <a:shade val="15000"/>
+                </a:schemeClr>
+              </a:lnRef>
+              <a:fillRef idx="1">
+                <a:schemeClr val="accent1"/>
+              </a:fillRef>
+              <a:effectRef idx="0">
+                <a:schemeClr val="accent1"/>
+              </a:effectRef>
+              <a:fontRef idx="minor">
+                <a:schemeClr val="lt1"/>
+              </a:fontRef>
+            </p:style>
+            <p:txBody>
+              <a:bodyPr rtlCol="0" anchor="ctr"/>
+              <a:lstStyle/>
+              <a:p>
+                <a:pPr algn="ctr"/>
+                <a:endParaRPr lang="en-US"/>
+              </a:p>
+            </p:txBody>
+          </p:sp>
+          <p:sp>
+            <p:nvSpPr>
+              <p:cNvPr id="125" name="Rectangle 124">
+                <a:extLst>
+                  <a:ext uri="{FF2B5EF4-FFF2-40B4-BE49-F238E27FC236}">
+                    <a16:creationId xmlns:a16="http://schemas.microsoft.com/office/drawing/2014/main" id="{B92EAC0D-8EFC-169A-A2D2-13F3F5BC0226}"/>
+                  </a:ext>
+                </a:extLst>
+              </p:cNvPr>
+              <p:cNvSpPr/>
+              <p:nvPr/>
+            </p:nvSpPr>
+            <p:spPr>
+              <a:xfrm rot="2100000">
+                <a:off x="8441620" y="2066201"/>
+                <a:ext cx="66583" cy="994150"/>
+              </a:xfrm>
+              <a:prstGeom prst="rect">
+                <a:avLst/>
+              </a:prstGeom>
+              <a:solidFill>
+                <a:schemeClr val="accent6"/>
+              </a:solidFill>
+              <a:ln>
+                <a:noFill/>
+              </a:ln>
+            </p:spPr>
+            <p:style>
+              <a:lnRef idx="2">
+                <a:schemeClr val="accent1">
+                  <a:shade val="15000"/>
+                </a:schemeClr>
+              </a:lnRef>
+              <a:fillRef idx="1">
+                <a:schemeClr val="accent1"/>
+              </a:fillRef>
+              <a:effectRef idx="0">
+                <a:schemeClr val="accent1"/>
+              </a:effectRef>
+              <a:fontRef idx="minor">
+                <a:schemeClr val="lt1"/>
+              </a:fontRef>
+            </p:style>
+            <p:txBody>
+              <a:bodyPr rtlCol="0" anchor="ctr"/>
+              <a:lstStyle/>
+              <a:p>
+                <a:pPr algn="ctr"/>
+                <a:endParaRPr lang="en-US"/>
+              </a:p>
+            </p:txBody>
+          </p:sp>
+          <p:sp>
+            <p:nvSpPr>
+              <p:cNvPr id="126" name="Rectangle 125">
+                <a:extLst>
+                  <a:ext uri="{FF2B5EF4-FFF2-40B4-BE49-F238E27FC236}">
+                    <a16:creationId xmlns:a16="http://schemas.microsoft.com/office/drawing/2014/main" id="{2326CC2C-8A7B-52C7-B64C-CCF9FFCC06BA}"/>
+                  </a:ext>
+                </a:extLst>
+              </p:cNvPr>
+              <p:cNvSpPr/>
+              <p:nvPr/>
+            </p:nvSpPr>
+            <p:spPr>
+              <a:xfrm rot="2100000">
+                <a:off x="8556193" y="2147835"/>
+                <a:ext cx="66583" cy="994150"/>
+              </a:xfrm>
+              <a:prstGeom prst="rect">
+                <a:avLst/>
+              </a:prstGeom>
+              <a:solidFill>
+                <a:schemeClr val="accent6"/>
+              </a:solidFill>
+              <a:ln>
+                <a:noFill/>
+              </a:ln>
+            </p:spPr>
+            <p:style>
+              <a:lnRef idx="2">
+                <a:schemeClr val="accent1">
+                  <a:shade val="15000"/>
+                </a:schemeClr>
+              </a:lnRef>
+              <a:fillRef idx="1">
+                <a:schemeClr val="accent1"/>
+              </a:fillRef>
+              <a:effectRef idx="0">
+                <a:schemeClr val="accent1"/>
+              </a:effectRef>
+              <a:fontRef idx="minor">
+                <a:schemeClr val="lt1"/>
+              </a:fontRef>
+            </p:style>
+            <p:txBody>
+              <a:bodyPr rtlCol="0" anchor="ctr"/>
+              <a:lstStyle/>
+              <a:p>
+                <a:pPr algn="ctr"/>
+                <a:endParaRPr lang="en-US"/>
+              </a:p>
+            </p:txBody>
+          </p:sp>
+          <p:sp>
+            <p:nvSpPr>
+              <p:cNvPr id="127" name="Rectangle 126">
+                <a:extLst>
+                  <a:ext uri="{FF2B5EF4-FFF2-40B4-BE49-F238E27FC236}">
+                    <a16:creationId xmlns:a16="http://schemas.microsoft.com/office/drawing/2014/main" id="{B47446E3-BCA2-31DC-2DC8-EC6C0AED06A5}"/>
+                  </a:ext>
+                </a:extLst>
+              </p:cNvPr>
+              <p:cNvSpPr/>
+              <p:nvPr/>
+            </p:nvSpPr>
+            <p:spPr>
+              <a:xfrm rot="2100000">
+                <a:off x="8683540" y="2230864"/>
+                <a:ext cx="66583" cy="994150"/>
+              </a:xfrm>
+              <a:prstGeom prst="rect">
+                <a:avLst/>
+              </a:prstGeom>
+              <a:solidFill>
+                <a:schemeClr val="accent6"/>
+              </a:solidFill>
+              <a:ln>
+                <a:noFill/>
+              </a:ln>
+            </p:spPr>
+            <p:style>
+              <a:lnRef idx="2">
+                <a:schemeClr val="accent1">
+                  <a:shade val="15000"/>
+                </a:schemeClr>
+              </a:lnRef>
+              <a:fillRef idx="1">
+                <a:schemeClr val="accent1"/>
+              </a:fillRef>
+              <a:effectRef idx="0">
+                <a:schemeClr val="accent1"/>
+              </a:effectRef>
+              <a:fontRef idx="minor">
+                <a:schemeClr val="lt1"/>
+              </a:fontRef>
+            </p:style>
+            <p:txBody>
+              <a:bodyPr rtlCol="0" anchor="ctr"/>
+              <a:lstStyle/>
+              <a:p>
+                <a:pPr algn="ctr"/>
+                <a:endParaRPr lang="en-US"/>
+              </a:p>
+            </p:txBody>
+          </p:sp>
+          <p:sp>
+            <p:nvSpPr>
+              <p:cNvPr id="128" name="Rectangle 127">
+                <a:extLst>
+                  <a:ext uri="{FF2B5EF4-FFF2-40B4-BE49-F238E27FC236}">
+                    <a16:creationId xmlns:a16="http://schemas.microsoft.com/office/drawing/2014/main" id="{73F66EEB-D84C-6238-69BD-1055BD9E9151}"/>
+                  </a:ext>
+                </a:extLst>
+              </p:cNvPr>
+              <p:cNvSpPr/>
+              <p:nvPr/>
+            </p:nvSpPr>
+            <p:spPr>
+              <a:xfrm rot="2100000">
+                <a:off x="8811288" y="2320156"/>
+                <a:ext cx="66583" cy="994150"/>
+              </a:xfrm>
+              <a:prstGeom prst="rect">
+                <a:avLst/>
+              </a:prstGeom>
+              <a:solidFill>
+                <a:schemeClr val="accent6"/>
+              </a:solidFill>
+              <a:ln>
+                <a:noFill/>
+              </a:ln>
+            </p:spPr>
+            <p:style>
+              <a:lnRef idx="2">
+                <a:schemeClr val="accent1">
+                  <a:shade val="15000"/>
+                </a:schemeClr>
+              </a:lnRef>
+              <a:fillRef idx="1">
+                <a:schemeClr val="accent1"/>
+              </a:fillRef>
+              <a:effectRef idx="0">
+                <a:schemeClr val="accent1"/>
+              </a:effectRef>
+              <a:fontRef idx="minor">
+                <a:schemeClr val="lt1"/>
+              </a:fontRef>
+            </p:style>
+            <p:txBody>
+              <a:bodyPr rtlCol="0" anchor="ctr"/>
+              <a:lstStyle/>
+              <a:p>
+                <a:pPr algn="ctr"/>
+                <a:endParaRPr lang="en-US"/>
+              </a:p>
+            </p:txBody>
+          </p:sp>
+          <p:sp>
+            <p:nvSpPr>
+              <p:cNvPr id="129" name="Rectangle 128">
+                <a:extLst>
+                  <a:ext uri="{FF2B5EF4-FFF2-40B4-BE49-F238E27FC236}">
+                    <a16:creationId xmlns:a16="http://schemas.microsoft.com/office/drawing/2014/main" id="{FC1959FE-5C8C-984A-A797-CFD9B0504CC7}"/>
+                  </a:ext>
+                </a:extLst>
+              </p:cNvPr>
+              <p:cNvSpPr/>
+              <p:nvPr/>
+            </p:nvSpPr>
+            <p:spPr>
+              <a:xfrm rot="2100000">
+                <a:off x="8937483" y="2401790"/>
+                <a:ext cx="66583" cy="994150"/>
+              </a:xfrm>
+              <a:prstGeom prst="rect">
+                <a:avLst/>
+              </a:prstGeom>
+              <a:solidFill>
+                <a:schemeClr val="accent6"/>
+              </a:solidFill>
+              <a:ln>
+                <a:noFill/>
+              </a:ln>
+            </p:spPr>
+            <p:style>
+              <a:lnRef idx="2">
+                <a:schemeClr val="accent1">
+                  <a:shade val="15000"/>
+                </a:schemeClr>
+              </a:lnRef>
+              <a:fillRef idx="1">
+                <a:schemeClr val="accent1"/>
+              </a:fillRef>
+              <a:effectRef idx="0">
+                <a:schemeClr val="accent1"/>
+              </a:effectRef>
+              <a:fontRef idx="minor">
+                <a:schemeClr val="lt1"/>
+              </a:fontRef>
+            </p:style>
+            <p:txBody>
+              <a:bodyPr rtlCol="0" anchor="ctr"/>
+              <a:lstStyle/>
+              <a:p>
+                <a:pPr algn="ctr"/>
+                <a:endParaRPr lang="en-US"/>
+              </a:p>
+            </p:txBody>
+          </p:sp>
+          <p:sp>
+            <p:nvSpPr>
+              <p:cNvPr id="130" name="Rectangle 129">
+                <a:extLst>
+                  <a:ext uri="{FF2B5EF4-FFF2-40B4-BE49-F238E27FC236}">
+                    <a16:creationId xmlns:a16="http://schemas.microsoft.com/office/drawing/2014/main" id="{6F62FE44-D94E-0C2C-7064-E6E98DF266BF}"/>
+                  </a:ext>
+                </a:extLst>
+              </p:cNvPr>
+              <p:cNvSpPr/>
+              <p:nvPr/>
+            </p:nvSpPr>
+            <p:spPr>
+              <a:xfrm rot="2100000">
+                <a:off x="9064830" y="2484819"/>
+                <a:ext cx="66583" cy="994150"/>
+              </a:xfrm>
+              <a:prstGeom prst="rect">
+                <a:avLst/>
+              </a:prstGeom>
+              <a:solidFill>
+                <a:schemeClr val="accent6"/>
+              </a:solidFill>
+              <a:ln>
+                <a:noFill/>
+              </a:ln>
+            </p:spPr>
+            <p:style>
+              <a:lnRef idx="2">
+                <a:schemeClr val="accent1">
+                  <a:shade val="15000"/>
+                </a:schemeClr>
+              </a:lnRef>
+              <a:fillRef idx="1">
+                <a:schemeClr val="accent1"/>
+              </a:fillRef>
+              <a:effectRef idx="0">
+                <a:schemeClr val="accent1"/>
+              </a:effectRef>
+              <a:fontRef idx="minor">
+                <a:schemeClr val="lt1"/>
+              </a:fontRef>
+            </p:style>
+            <p:txBody>
+              <a:bodyPr rtlCol="0" anchor="ctr"/>
+              <a:lstStyle/>
+              <a:p>
+                <a:pPr algn="ctr"/>
+                <a:endParaRPr lang="en-US"/>
+              </a:p>
+            </p:txBody>
+          </p:sp>
+          <p:sp>
+            <p:nvSpPr>
+              <p:cNvPr id="131" name="Rectangle 130">
+                <a:extLst>
+                  <a:ext uri="{FF2B5EF4-FFF2-40B4-BE49-F238E27FC236}">
+                    <a16:creationId xmlns:a16="http://schemas.microsoft.com/office/drawing/2014/main" id="{F9C8E38E-2EB5-3570-CD09-FF376BD4F374}"/>
+                  </a:ext>
+                </a:extLst>
+              </p:cNvPr>
+              <p:cNvSpPr/>
+              <p:nvPr/>
+            </p:nvSpPr>
+            <p:spPr>
+              <a:xfrm rot="2100000">
+                <a:off x="9192578" y="2574111"/>
+                <a:ext cx="66583" cy="994150"/>
+              </a:xfrm>
+              <a:prstGeom prst="rect">
+                <a:avLst/>
+              </a:prstGeom>
+              <a:solidFill>
+                <a:schemeClr val="accent6"/>
+              </a:solidFill>
+              <a:ln>
+                <a:noFill/>
+              </a:ln>
+            </p:spPr>
+            <p:style>
+              <a:lnRef idx="2">
+                <a:schemeClr val="accent1">
+                  <a:shade val="15000"/>
+                </a:schemeClr>
+              </a:lnRef>
+              <a:fillRef idx="1">
+                <a:schemeClr val="accent1"/>
+              </a:fillRef>
+              <a:effectRef idx="0">
+                <a:schemeClr val="accent1"/>
+              </a:effectRef>
+              <a:fontRef idx="minor">
+                <a:schemeClr val="lt1"/>
+              </a:fontRef>
+            </p:style>
+            <p:txBody>
+              <a:bodyPr rtlCol="0" anchor="ctr"/>
+              <a:lstStyle/>
+              <a:p>
+                <a:pPr algn="ctr"/>
+                <a:endParaRPr lang="en-US"/>
+              </a:p>
+            </p:txBody>
+          </p:sp>
+          <p:sp>
+            <p:nvSpPr>
+              <p:cNvPr id="132" name="Rectangle 131">
+                <a:extLst>
+                  <a:ext uri="{FF2B5EF4-FFF2-40B4-BE49-F238E27FC236}">
+                    <a16:creationId xmlns:a16="http://schemas.microsoft.com/office/drawing/2014/main" id="{46ADDD4B-03EF-04D0-93B3-039DD453232F}"/>
+                  </a:ext>
+                </a:extLst>
+              </p:cNvPr>
+              <p:cNvSpPr/>
+              <p:nvPr/>
+            </p:nvSpPr>
+            <p:spPr>
+              <a:xfrm rot="2100000">
+                <a:off x="9320568" y="2669902"/>
+                <a:ext cx="66583" cy="994150"/>
+              </a:xfrm>
+              <a:prstGeom prst="rect">
+                <a:avLst/>
+              </a:prstGeom>
+              <a:solidFill>
+                <a:schemeClr val="accent6"/>
+              </a:solidFill>
+              <a:ln>
+                <a:noFill/>
+              </a:ln>
+            </p:spPr>
+            <p:style>
+              <a:lnRef idx="2">
+                <a:schemeClr val="accent1">
+                  <a:shade val="15000"/>
+                </a:schemeClr>
+              </a:lnRef>
+              <a:fillRef idx="1">
+                <a:schemeClr val="accent1"/>
+              </a:fillRef>
+              <a:effectRef idx="0">
+                <a:schemeClr val="accent1"/>
+              </a:effectRef>
+              <a:fontRef idx="minor">
+                <a:schemeClr val="lt1"/>
+              </a:fontRef>
+            </p:style>
+            <p:txBody>
+              <a:bodyPr rtlCol="0" anchor="ctr"/>
+              <a:lstStyle/>
+              <a:p>
+                <a:pPr algn="ctr"/>
+                <a:endParaRPr lang="en-US"/>
+              </a:p>
+            </p:txBody>
+          </p:sp>
+        </p:grpSp>
+        <p:cxnSp>
+          <p:nvCxnSpPr>
+            <p:cNvPr id="115" name="Straight Arrow Connector 114">
+              <a:extLst>
+                <a:ext uri="{FF2B5EF4-FFF2-40B4-BE49-F238E27FC236}">
+                  <a16:creationId xmlns:a16="http://schemas.microsoft.com/office/drawing/2014/main" id="{F25EA3C1-B6CC-C1CE-C375-258E5CAA2A67}"/>
+                </a:ext>
+              </a:extLst>
+            </p:cNvPr>
+            <p:cNvCxnSpPr>
+              <a:cxnSpLocks/>
+            </p:cNvCxnSpPr>
+            <p:nvPr/>
+          </p:nvCxnSpPr>
+          <p:spPr>
+            <a:xfrm rot="2100000" flipV="1">
+              <a:off x="8193297" y="1557795"/>
+              <a:ext cx="0" cy="1280160"/>
+            </a:xfrm>
+            <a:prstGeom prst="straightConnector1">
+              <a:avLst/>
+            </a:prstGeom>
+            <a:ln>
+              <a:solidFill>
+                <a:schemeClr val="tx1"/>
+              </a:solidFill>
+              <a:tailEnd type="triangle"/>
+            </a:ln>
+          </p:spPr>
+          <p:style>
+            <a:lnRef idx="2">
+              <a:schemeClr val="accent1"/>
+            </a:lnRef>
+            <a:fillRef idx="0">
+              <a:schemeClr val="accent1"/>
+            </a:fillRef>
+            <a:effectRef idx="1">
+              <a:schemeClr val="accent1"/>
+            </a:effectRef>
+            <a:fontRef idx="minor">
+              <a:schemeClr val="tx1"/>
+            </a:fontRef>
+          </p:style>
+        </p:cxnSp>
+        <p:cxnSp>
+          <p:nvCxnSpPr>
+            <p:cNvPr id="116" name="Straight Arrow Connector 115">
+              <a:extLst>
+                <a:ext uri="{FF2B5EF4-FFF2-40B4-BE49-F238E27FC236}">
+                  <a16:creationId xmlns:a16="http://schemas.microsoft.com/office/drawing/2014/main" id="{ACAA266A-7907-C87C-4E85-8F56FAE012DC}"/>
+                </a:ext>
+              </a:extLst>
+            </p:cNvPr>
+            <p:cNvCxnSpPr>
+              <a:cxnSpLocks/>
+            </p:cNvCxnSpPr>
+            <p:nvPr/>
+          </p:nvCxnSpPr>
+          <p:spPr>
+            <a:xfrm rot="7500000" flipV="1">
+              <a:off x="8606382" y="2311737"/>
+              <a:ext cx="0" cy="1920240"/>
+            </a:xfrm>
+            <a:prstGeom prst="straightConnector1">
+              <a:avLst/>
+            </a:prstGeom>
+            <a:ln>
+              <a:solidFill>
+                <a:schemeClr val="tx1"/>
+              </a:solidFill>
+              <a:tailEnd type="triangle"/>
+            </a:ln>
+          </p:spPr>
+          <p:style>
+            <a:lnRef idx="2">
+              <a:schemeClr val="accent1"/>
+            </a:lnRef>
+            <a:fillRef idx="0">
+              <a:schemeClr val="accent1"/>
+            </a:fillRef>
+            <a:effectRef idx="1">
+              <a:schemeClr val="accent1"/>
+            </a:effectRef>
+            <a:fontRef idx="minor">
+              <a:schemeClr val="tx1"/>
+            </a:fontRef>
+          </p:style>
+        </p:cxnSp>
+        <p:cxnSp>
+          <p:nvCxnSpPr>
+            <p:cNvPr id="117" name="Straight Connector 116">
+              <a:extLst>
+                <a:ext uri="{FF2B5EF4-FFF2-40B4-BE49-F238E27FC236}">
+                  <a16:creationId xmlns:a16="http://schemas.microsoft.com/office/drawing/2014/main" id="{10B70865-846B-BA50-9DC9-12BE85E4DBE5}"/>
+                </a:ext>
+              </a:extLst>
+            </p:cNvPr>
+            <p:cNvCxnSpPr>
+              <a:cxnSpLocks/>
+            </p:cNvCxnSpPr>
+            <p:nvPr/>
+          </p:nvCxnSpPr>
+          <p:spPr>
+            <a:xfrm>
+              <a:off x="7819897" y="1641218"/>
+              <a:ext cx="0" cy="2181342"/>
+            </a:xfrm>
+            <a:prstGeom prst="line">
+              <a:avLst/>
+            </a:prstGeom>
+            <a:ln>
+              <a:solidFill>
+                <a:schemeClr val="tx1"/>
+              </a:solidFill>
+              <a:prstDash val="sysDash"/>
+            </a:ln>
+          </p:spPr>
+          <p:style>
+            <a:lnRef idx="2">
+              <a:schemeClr val="accent1"/>
+            </a:lnRef>
+            <a:fillRef idx="0">
+              <a:schemeClr val="accent1"/>
+            </a:fillRef>
+            <a:effectRef idx="1">
+              <a:schemeClr val="accent1"/>
+            </a:effectRef>
+            <a:fontRef idx="minor">
+              <a:schemeClr val="tx1"/>
+            </a:fontRef>
+          </p:style>
+        </p:cxnSp>
+        <p:sp>
+          <p:nvSpPr>
+            <p:cNvPr id="118" name="Arc 117">
+              <a:extLst>
+                <a:ext uri="{FF2B5EF4-FFF2-40B4-BE49-F238E27FC236}">
+                  <a16:creationId xmlns:a16="http://schemas.microsoft.com/office/drawing/2014/main" id="{07FE441E-9CFB-6EED-7D48-1572E6634CD9}"/>
+                </a:ext>
+              </a:extLst>
+            </p:cNvPr>
+            <p:cNvSpPr/>
+            <p:nvPr/>
+          </p:nvSpPr>
+          <p:spPr>
+            <a:xfrm>
+              <a:off x="7603233" y="2450816"/>
+              <a:ext cx="457200" cy="457200"/>
+            </a:xfrm>
+            <a:prstGeom prst="arc">
+              <a:avLst>
+                <a:gd name="adj1" fmla="val 16200000"/>
+                <a:gd name="adj2" fmla="val 18489326"/>
+              </a:avLst>
+            </a:prstGeom>
+            <a:solidFill>
+              <a:srgbClr val="FFFF00"/>
+            </a:solidFill>
+          </p:spPr>
+          <p:style>
+            <a:lnRef idx="2">
+              <a:schemeClr val="accent1"/>
+            </a:lnRef>
+            <a:fillRef idx="0">
+              <a:schemeClr val="accent1"/>
+            </a:fillRef>
+            <a:effectRef idx="1">
+              <a:schemeClr val="accent1"/>
+            </a:effectRef>
+            <a:fontRef idx="minor">
+              <a:schemeClr val="tx1"/>
+            </a:fontRef>
+          </p:style>
+          <p:txBody>
+            <a:bodyPr rtlCol="0" anchor="ctr"/>
+            <a:lstStyle/>
+            <a:p>
+              <a:pPr algn="ctr"/>
+              <a:endParaRPr lang="en-US"/>
+            </a:p>
+          </p:txBody>
+        </p:sp>
+        <p:sp>
+          <p:nvSpPr>
+            <p:cNvPr id="119" name="TextBox 118">
+              <a:extLst>
+                <a:ext uri="{FF2B5EF4-FFF2-40B4-BE49-F238E27FC236}">
+                  <a16:creationId xmlns:a16="http://schemas.microsoft.com/office/drawing/2014/main" id="{914B963A-7491-E7E9-69AB-A1CED3D2746D}"/>
+                </a:ext>
+              </a:extLst>
+            </p:cNvPr>
+            <p:cNvSpPr txBox="1"/>
+            <p:nvPr/>
+          </p:nvSpPr>
+          <p:spPr>
+            <a:xfrm>
+              <a:off x="9353859" y="3602391"/>
+              <a:ext cx="264816" cy="307777"/>
+            </a:xfrm>
+            <a:prstGeom prst="rect">
+              <a:avLst/>
+            </a:prstGeom>
+            <a:noFill/>
+          </p:spPr>
+          <p:txBody>
+            <a:bodyPr wrap="none" rtlCol="0">
+              <a:spAutoFit/>
+            </a:bodyPr>
+            <a:lstStyle/>
+            <a:p>
+              <a:r>
+                <a:rPr lang="en-US" sz="1400" dirty="0">
+                  <a:latin typeface="Garamond" panose="02020404030301010803" pitchFamily="18" charset="0"/>
+                </a:rPr>
+                <a:t>x</a:t>
+              </a:r>
+            </a:p>
+          </p:txBody>
+        </p:sp>
+        <p:sp>
+          <p:nvSpPr>
+            <p:cNvPr id="120" name="TextBox 119">
+              <a:extLst>
+                <a:ext uri="{FF2B5EF4-FFF2-40B4-BE49-F238E27FC236}">
+                  <a16:creationId xmlns:a16="http://schemas.microsoft.com/office/drawing/2014/main" id="{F90EDC23-E853-4E1A-CC09-52AC1F44D1D4}"/>
+                </a:ext>
+              </a:extLst>
+            </p:cNvPr>
+            <p:cNvSpPr txBox="1"/>
+            <p:nvPr/>
+          </p:nvSpPr>
+          <p:spPr>
+            <a:xfrm>
+              <a:off x="8525732" y="1441701"/>
+              <a:ext cx="260008" cy="307777"/>
+            </a:xfrm>
+            <a:prstGeom prst="rect">
+              <a:avLst/>
+            </a:prstGeom>
+            <a:noFill/>
+          </p:spPr>
+          <p:txBody>
+            <a:bodyPr wrap="none" rtlCol="0">
+              <a:spAutoFit/>
+            </a:bodyPr>
+            <a:lstStyle/>
+            <a:p>
+              <a:r>
+                <a:rPr lang="en-US" sz="1400" dirty="0">
+                  <a:latin typeface="Garamond" panose="02020404030301010803" pitchFamily="18" charset="0"/>
+                </a:rPr>
+                <a:t>y</a:t>
+              </a:r>
+            </a:p>
+          </p:txBody>
+        </p:sp>
+        <p:sp>
+          <p:nvSpPr>
+            <p:cNvPr id="121" name="TextBox 120">
+              <a:extLst>
+                <a:ext uri="{FF2B5EF4-FFF2-40B4-BE49-F238E27FC236}">
+                  <a16:creationId xmlns:a16="http://schemas.microsoft.com/office/drawing/2014/main" id="{D9CFDA6E-BFCF-76BB-55C9-64D8F634AC32}"/>
+                </a:ext>
+              </a:extLst>
+            </p:cNvPr>
+            <p:cNvSpPr txBox="1"/>
+            <p:nvPr/>
+          </p:nvSpPr>
+          <p:spPr>
+            <a:xfrm>
+              <a:off x="8492934" y="2623336"/>
+              <a:ext cx="519951" cy="307777"/>
+            </a:xfrm>
+            <a:prstGeom prst="rect">
+              <a:avLst/>
+            </a:prstGeom>
+            <a:solidFill>
+              <a:srgbClr val="92D050"/>
+            </a:solidFill>
+          </p:spPr>
+          <p:txBody>
+            <a:bodyPr wrap="none" rtlCol="0">
+              <a:spAutoFit/>
+            </a:bodyPr>
+            <a:lstStyle/>
+            <a:p>
+              <a:r>
+                <a:rPr lang="en-US" sz="1400" dirty="0">
+                  <a:latin typeface="Garamond" panose="02020404030301010803" pitchFamily="18" charset="0"/>
+                </a:rPr>
+                <a:t>farm</a:t>
+              </a:r>
+            </a:p>
+          </p:txBody>
+        </p:sp>
+      </p:grpSp>
+      <p:grpSp>
+        <p:nvGrpSpPr>
+          <p:cNvPr id="143" name="Group 142">
+            <a:extLst>
+              <a:ext uri="{FF2B5EF4-FFF2-40B4-BE49-F238E27FC236}">
+                <a16:creationId xmlns:a16="http://schemas.microsoft.com/office/drawing/2014/main" id="{C54AC344-65B5-BB03-CCB0-1EFCDB120770}"/>
+              </a:ext>
+            </a:extLst>
+          </p:cNvPr>
+          <p:cNvGrpSpPr/>
+          <p:nvPr/>
+        </p:nvGrpSpPr>
+        <p:grpSpPr>
+          <a:xfrm>
+            <a:off x="6019085" y="4911123"/>
+            <a:ext cx="1188720" cy="1188720"/>
+            <a:chOff x="6034137" y="4877355"/>
+            <a:chExt cx="1188720" cy="1188720"/>
+          </a:xfrm>
+        </p:grpSpPr>
+        <p:sp>
+          <p:nvSpPr>
+            <p:cNvPr id="108" name="Oval 107">
+              <a:extLst>
+                <a:ext uri="{FF2B5EF4-FFF2-40B4-BE49-F238E27FC236}">
+                  <a16:creationId xmlns:a16="http://schemas.microsoft.com/office/drawing/2014/main" id="{33D66C8D-D6B9-BF66-21F7-369D7F32DB3C}"/>
+                </a:ext>
+              </a:extLst>
+            </p:cNvPr>
+            <p:cNvSpPr/>
+            <p:nvPr/>
+          </p:nvSpPr>
+          <p:spPr>
+            <a:xfrm>
+              <a:off x="6034137" y="4877355"/>
+              <a:ext cx="1188720" cy="1188720"/>
+            </a:xfrm>
+            <a:prstGeom prst="ellipse">
+              <a:avLst/>
+            </a:prstGeom>
+            <a:solidFill>
+              <a:srgbClr val="92D050"/>
+            </a:solidFill>
+            <a:ln>
+              <a:solidFill>
+                <a:schemeClr val="tx1"/>
+              </a:solidFill>
+            </a:ln>
+          </p:spPr>
+          <p:style>
+            <a:lnRef idx="2">
+              <a:schemeClr val="accent1">
+                <a:shade val="15000"/>
+              </a:schemeClr>
+            </a:lnRef>
+            <a:fillRef idx="1">
+              <a:schemeClr val="accent1"/>
+            </a:fillRef>
+            <a:effectRef idx="0">
+              <a:schemeClr val="accent1"/>
+            </a:effectRef>
+            <a:fontRef idx="minor">
+              <a:schemeClr val="lt1"/>
+            </a:fontRef>
+          </p:style>
+          <p:txBody>
+            <a:bodyPr rtlCol="0" anchor="ctr"/>
+            <a:lstStyle/>
+            <a:p>
+              <a:pPr algn="ctr"/>
+              <a:endParaRPr lang="en-US"/>
+            </a:p>
+          </p:txBody>
+        </p:sp>
+        <p:sp>
+          <p:nvSpPr>
+            <p:cNvPr id="140" name="Donut 139">
+              <a:extLst>
+                <a:ext uri="{FF2B5EF4-FFF2-40B4-BE49-F238E27FC236}">
+                  <a16:creationId xmlns:a16="http://schemas.microsoft.com/office/drawing/2014/main" id="{223BFBEC-1CC7-3068-7D71-FE928DF5F998}"/>
+                </a:ext>
+              </a:extLst>
+            </p:cNvPr>
+            <p:cNvSpPr/>
+            <p:nvPr/>
+          </p:nvSpPr>
+          <p:spPr>
+            <a:xfrm>
+              <a:off x="6122568" y="4968795"/>
+              <a:ext cx="1005840" cy="1005840"/>
+            </a:xfrm>
+            <a:prstGeom prst="donut">
+              <a:avLst>
+                <a:gd name="adj" fmla="val 7543"/>
+              </a:avLst>
+            </a:prstGeom>
+            <a:solidFill>
+              <a:schemeClr val="accent6"/>
+            </a:solidFill>
+            <a:ln>
+              <a:noFill/>
+            </a:ln>
+          </p:spPr>
+          <p:style>
+            <a:lnRef idx="2">
+              <a:schemeClr val="accent1">
+                <a:shade val="15000"/>
+              </a:schemeClr>
+            </a:lnRef>
+            <a:fillRef idx="1">
+              <a:schemeClr val="accent1"/>
+            </a:fillRef>
+            <a:effectRef idx="0">
+              <a:schemeClr val="accent1"/>
+            </a:effectRef>
+            <a:fontRef idx="minor">
+              <a:schemeClr val="lt1"/>
+            </a:fontRef>
+          </p:style>
+          <p:txBody>
+            <a:bodyPr rtlCol="0" anchor="ctr"/>
+            <a:lstStyle/>
+            <a:p>
+              <a:pPr algn="ctr"/>
+              <a:endParaRPr lang="en-US">
+                <a:solidFill>
+                  <a:schemeClr val="tx1"/>
+                </a:solidFill>
+              </a:endParaRPr>
+            </a:p>
+          </p:txBody>
+        </p:sp>
+        <p:sp>
+          <p:nvSpPr>
+            <p:cNvPr id="141" name="Donut 140">
+              <a:extLst>
+                <a:ext uri="{FF2B5EF4-FFF2-40B4-BE49-F238E27FC236}">
+                  <a16:creationId xmlns:a16="http://schemas.microsoft.com/office/drawing/2014/main" id="{49C79510-D2DF-FB91-1146-9B999F5D6758}"/>
+                </a:ext>
+              </a:extLst>
+            </p:cNvPr>
+            <p:cNvSpPr/>
+            <p:nvPr/>
+          </p:nvSpPr>
+          <p:spPr>
+            <a:xfrm>
+              <a:off x="6283677" y="5129904"/>
+              <a:ext cx="685800" cy="685800"/>
+            </a:xfrm>
+            <a:prstGeom prst="donut">
+              <a:avLst>
+                <a:gd name="adj" fmla="val 10819"/>
+              </a:avLst>
+            </a:prstGeom>
+            <a:solidFill>
+              <a:schemeClr val="accent6"/>
+            </a:solidFill>
+            <a:ln>
+              <a:noFill/>
+            </a:ln>
+          </p:spPr>
+          <p:style>
+            <a:lnRef idx="2">
+              <a:schemeClr val="accent1">
+                <a:shade val="15000"/>
+              </a:schemeClr>
+            </a:lnRef>
+            <a:fillRef idx="1">
+              <a:schemeClr val="accent1"/>
+            </a:fillRef>
+            <a:effectRef idx="0">
+              <a:schemeClr val="accent1"/>
+            </a:effectRef>
+            <a:fontRef idx="minor">
+              <a:schemeClr val="lt1"/>
+            </a:fontRef>
+          </p:style>
+          <p:txBody>
+            <a:bodyPr rtlCol="0" anchor="ctr"/>
+            <a:lstStyle/>
+            <a:p>
+              <a:pPr algn="ctr"/>
+              <a:endParaRPr lang="en-US">
+                <a:solidFill>
+                  <a:schemeClr val="tx1"/>
+                </a:solidFill>
+              </a:endParaRPr>
+            </a:p>
+          </p:txBody>
+        </p:sp>
+        <p:sp>
+          <p:nvSpPr>
+            <p:cNvPr id="142" name="Donut 141">
+              <a:extLst>
+                <a:ext uri="{FF2B5EF4-FFF2-40B4-BE49-F238E27FC236}">
+                  <a16:creationId xmlns:a16="http://schemas.microsoft.com/office/drawing/2014/main" id="{5B6BBD26-19EA-48D6-CF75-EE4D79C4E4A7}"/>
+                </a:ext>
+              </a:extLst>
+            </p:cNvPr>
+            <p:cNvSpPr/>
+            <p:nvPr/>
+          </p:nvSpPr>
+          <p:spPr>
+            <a:xfrm>
+              <a:off x="6442340" y="5294830"/>
+              <a:ext cx="365760" cy="365760"/>
+            </a:xfrm>
+            <a:prstGeom prst="donut">
+              <a:avLst>
+                <a:gd name="adj" fmla="val 19333"/>
+              </a:avLst>
+            </a:prstGeom>
+            <a:solidFill>
+              <a:schemeClr val="accent6"/>
+            </a:solidFill>
+            <a:ln>
+              <a:noFill/>
+            </a:ln>
+          </p:spPr>
+          <p:style>
+            <a:lnRef idx="2">
+              <a:schemeClr val="accent1">
+                <a:shade val="15000"/>
+              </a:schemeClr>
+            </a:lnRef>
+            <a:fillRef idx="1">
+              <a:schemeClr val="accent1"/>
+            </a:fillRef>
+            <a:effectRef idx="0">
+              <a:schemeClr val="accent1"/>
+            </a:effectRef>
+            <a:fontRef idx="minor">
+              <a:schemeClr val="lt1"/>
+            </a:fontRef>
+          </p:style>
+          <p:txBody>
+            <a:bodyPr rtlCol="0" anchor="ctr"/>
+            <a:lstStyle/>
+            <a:p>
+              <a:pPr algn="ctr"/>
+              <a:endParaRPr lang="en-US">
+                <a:solidFill>
+                  <a:schemeClr val="tx1"/>
+                </a:solidFill>
+              </a:endParaRPr>
+            </a:p>
+          </p:txBody>
+        </p:sp>
+      </p:grpSp>
     </p:spTree>
     <p:extLst>
       <p:ext uri="{BB962C8B-B14F-4D97-AF65-F5344CB8AC3E}">
@@ -13732,4 +15344,319 @@
     </a:ext>
   </a:extLst>
 </a:theme>
+</file>
+
+<file path=ppt/theme/theme2.xml><?xml version="1.0" encoding="utf-8"?>
+<a:theme xmlns:a="http://schemas.openxmlformats.org/drawingml/2006/main" name="Office Theme">
+  <a:themeElements>
+    <a:clrScheme name="Office">
+      <a:dk1>
+        <a:sysClr val="windowText" lastClr="000000"/>
+      </a:dk1>
+      <a:lt1>
+        <a:sysClr val="window" lastClr="FFFFFF"/>
+      </a:lt1>
+      <a:dk2>
+        <a:srgbClr val="0E2841"/>
+      </a:dk2>
+      <a:lt2>
+        <a:srgbClr val="E8E8E8"/>
+      </a:lt2>
+      <a:accent1>
+        <a:srgbClr val="156082"/>
+      </a:accent1>
+      <a:accent2>
+        <a:srgbClr val="E97132"/>
+      </a:accent2>
+      <a:accent3>
+        <a:srgbClr val="196B24"/>
+      </a:accent3>
+      <a:accent4>
+        <a:srgbClr val="0F9ED5"/>
+      </a:accent4>
+      <a:accent5>
+        <a:srgbClr val="A02B93"/>
+      </a:accent5>
+      <a:accent6>
+        <a:srgbClr val="4EA72E"/>
+      </a:accent6>
+      <a:hlink>
+        <a:srgbClr val="467886"/>
+      </a:hlink>
+      <a:folHlink>
+        <a:srgbClr val="96607D"/>
+      </a:folHlink>
+    </a:clrScheme>
+    <a:fontScheme name="Office">
+      <a:majorFont>
+        <a:latin typeface="Aptos Display" panose="02110004020202020204"/>
+        <a:ea typeface=""/>
+        <a:cs typeface=""/>
+        <a:font script="Jpan" typeface="游ゴシック Light"/>
+        <a:font script="Hang" typeface="맑은 고딕"/>
+        <a:font script="Hans" typeface="等线 Light"/>
+        <a:font script="Hant" typeface="新細明體"/>
+        <a:font script="Arab" typeface="Times New Roman"/>
+        <a:font script="Hebr" typeface="Times New Roman"/>
+        <a:font script="Thai" typeface="Angsana New"/>
+        <a:font script="Ethi" typeface="Nyala"/>
+        <a:font script="Beng" typeface="Vrinda"/>
+        <a:font script="Gujr" typeface="Shruti"/>
+        <a:font script="Khmr" typeface="MoolBoran"/>
+        <a:font script="Knda" typeface="Tunga"/>
+        <a:font script="Guru" typeface="Raavi"/>
+        <a:font script="Cans" typeface="Euphemia"/>
+        <a:font script="Cher" typeface="Plantagenet Cherokee"/>
+        <a:font script="Yiii" typeface="Microsoft Yi Baiti"/>
+        <a:font script="Tibt" typeface="Microsoft Himalaya"/>
+        <a:font script="Thaa" typeface="MV Boli"/>
+        <a:font script="Deva" typeface="Mangal"/>
+        <a:font script="Telu" typeface="Gautami"/>
+        <a:font script="Taml" typeface="Latha"/>
+        <a:font script="Syrc" typeface="Estrangelo Edessa"/>
+        <a:font script="Orya" typeface="Kalinga"/>
+        <a:font script="Mlym" typeface="Kartika"/>
+        <a:font script="Laoo" typeface="DokChampa"/>
+        <a:font script="Sinh" typeface="Iskoola Pota"/>
+        <a:font script="Mong" typeface="Mongolian Baiti"/>
+        <a:font script="Viet" typeface="Times New Roman"/>
+        <a:font script="Uigh" typeface="Microsoft Uighur"/>
+        <a:font script="Geor" typeface="Sylfaen"/>
+        <a:font script="Armn" typeface="Arial"/>
+        <a:font script="Bugi" typeface="Leelawadee UI"/>
+        <a:font script="Bopo" typeface="Microsoft JhengHei"/>
+        <a:font script="Java" typeface="Javanese Text"/>
+        <a:font script="Lisu" typeface="Segoe UI"/>
+        <a:font script="Mymr" typeface="Myanmar Text"/>
+        <a:font script="Nkoo" typeface="Ebrima"/>
+        <a:font script="Olck" typeface="Nirmala UI"/>
+        <a:font script="Osma" typeface="Ebrima"/>
+        <a:font script="Phag" typeface="Phagspa"/>
+        <a:font script="Syrn" typeface="Estrangelo Edessa"/>
+        <a:font script="Syrj" typeface="Estrangelo Edessa"/>
+        <a:font script="Syre" typeface="Estrangelo Edessa"/>
+        <a:font script="Sora" typeface="Nirmala UI"/>
+        <a:font script="Tale" typeface="Microsoft Tai Le"/>
+        <a:font script="Talu" typeface="Microsoft New Tai Lue"/>
+        <a:font script="Tfng" typeface="Ebrima"/>
+      </a:majorFont>
+      <a:minorFont>
+        <a:latin typeface="Aptos" panose="02110004020202020204"/>
+        <a:ea typeface=""/>
+        <a:cs typeface=""/>
+        <a:font script="Jpan" typeface="游ゴシック"/>
+        <a:font script="Hang" typeface="맑은 고딕"/>
+        <a:font script="Hans" typeface="等线"/>
+        <a:font script="Hant" typeface="新細明體"/>
+        <a:font script="Arab" typeface="Arial"/>
+        <a:font script="Hebr" typeface="Arial"/>
+        <a:font script="Thai" typeface="Cordia New"/>
+        <a:font script="Ethi" typeface="Nyala"/>
+        <a:font script="Beng" typeface="Vrinda"/>
+        <a:font script="Gujr" typeface="Shruti"/>
+        <a:font script="Khmr" typeface="DaunPenh"/>
+        <a:font script="Knda" typeface="Tunga"/>
+        <a:font script="Guru" typeface="Raavi"/>
+        <a:font script="Cans" typeface="Euphemia"/>
+        <a:font script="Cher" typeface="Plantagenet Cherokee"/>
+        <a:font script="Yiii" typeface="Microsoft Yi Baiti"/>
+        <a:font script="Tibt" typeface="Microsoft Himalaya"/>
+        <a:font script="Thaa" typeface="MV Boli"/>
+        <a:font script="Deva" typeface="Mangal"/>
+        <a:font script="Telu" typeface="Gautami"/>
+        <a:font script="Taml" typeface="Latha"/>
+        <a:font script="Syrc" typeface="Estrangelo Edessa"/>
+        <a:font script="Orya" typeface="Kalinga"/>
+        <a:font script="Mlym" typeface="Kartika"/>
+        <a:font script="Laoo" typeface="DokChampa"/>
+        <a:font script="Sinh" typeface="Iskoola Pota"/>
+        <a:font script="Mong" typeface="Mongolian Baiti"/>
+        <a:font script="Viet" typeface="Arial"/>
+        <a:font script="Uigh" typeface="Microsoft Uighur"/>
+        <a:font script="Geor" typeface="Sylfaen"/>
+        <a:font script="Armn" typeface="Arial"/>
+        <a:font script="Bugi" typeface="Leelawadee UI"/>
+        <a:font script="Bopo" typeface="Microsoft JhengHei"/>
+        <a:font script="Java" typeface="Javanese Text"/>
+        <a:font script="Lisu" typeface="Segoe UI"/>
+        <a:font script="Mymr" typeface="Myanmar Text"/>
+        <a:font script="Nkoo" typeface="Ebrima"/>
+        <a:font script="Olck" typeface="Nirmala UI"/>
+        <a:font script="Osma" typeface="Ebrima"/>
+        <a:font script="Phag" typeface="Phagspa"/>
+        <a:font script="Syrn" typeface="Estrangelo Edessa"/>
+        <a:font script="Syrj" typeface="Estrangelo Edessa"/>
+        <a:font script="Syre" typeface="Estrangelo Edessa"/>
+        <a:font script="Sora" typeface="Nirmala UI"/>
+        <a:font script="Tale" typeface="Microsoft Tai Le"/>
+        <a:font script="Talu" typeface="Microsoft New Tai Lue"/>
+        <a:font script="Tfng" typeface="Ebrima"/>
+      </a:minorFont>
+    </a:fontScheme>
+    <a:fmtScheme name="Office">
+      <a:fillStyleLst>
+        <a:solidFill>
+          <a:schemeClr val="phClr"/>
+        </a:solidFill>
+        <a:gradFill rotWithShape="1">
+          <a:gsLst>
+            <a:gs pos="0">
+              <a:schemeClr val="phClr">
+                <a:lumMod val="110000"/>
+                <a:satMod val="105000"/>
+                <a:tint val="67000"/>
+              </a:schemeClr>
+            </a:gs>
+            <a:gs pos="50000">
+              <a:schemeClr val="phClr">
+                <a:lumMod val="105000"/>
+                <a:satMod val="103000"/>
+                <a:tint val="73000"/>
+              </a:schemeClr>
+            </a:gs>
+            <a:gs pos="100000">
+              <a:schemeClr val="phClr">
+                <a:lumMod val="105000"/>
+                <a:satMod val="109000"/>
+                <a:tint val="81000"/>
+              </a:schemeClr>
+            </a:gs>
+          </a:gsLst>
+          <a:lin ang="5400000" scaled="0"/>
+        </a:gradFill>
+        <a:gradFill rotWithShape="1">
+          <a:gsLst>
+            <a:gs pos="0">
+              <a:schemeClr val="phClr">
+                <a:satMod val="103000"/>
+                <a:lumMod val="102000"/>
+                <a:tint val="94000"/>
+              </a:schemeClr>
+            </a:gs>
+            <a:gs pos="50000">
+              <a:schemeClr val="phClr">
+                <a:satMod val="110000"/>
+                <a:lumMod val="100000"/>
+                <a:shade val="100000"/>
+              </a:schemeClr>
+            </a:gs>
+            <a:gs pos="100000">
+              <a:schemeClr val="phClr">
+                <a:lumMod val="99000"/>
+                <a:satMod val="120000"/>
+                <a:shade val="78000"/>
+              </a:schemeClr>
+            </a:gs>
+          </a:gsLst>
+          <a:lin ang="5400000" scaled="0"/>
+        </a:gradFill>
+      </a:fillStyleLst>
+      <a:lnStyleLst>
+        <a:ln w="12700" cap="flat" cmpd="sng" algn="ctr">
+          <a:solidFill>
+            <a:schemeClr val="phClr"/>
+          </a:solidFill>
+          <a:prstDash val="solid"/>
+          <a:miter lim="800000"/>
+        </a:ln>
+        <a:ln w="19050" cap="flat" cmpd="sng" algn="ctr">
+          <a:solidFill>
+            <a:schemeClr val="phClr"/>
+          </a:solidFill>
+          <a:prstDash val="solid"/>
+          <a:miter lim="800000"/>
+        </a:ln>
+        <a:ln w="25400" cap="flat" cmpd="sng" algn="ctr">
+          <a:solidFill>
+            <a:schemeClr val="phClr"/>
+          </a:solidFill>
+          <a:prstDash val="solid"/>
+          <a:miter lim="800000"/>
+        </a:ln>
+      </a:lnStyleLst>
+      <a:effectStyleLst>
+        <a:effectStyle>
+          <a:effectLst/>
+        </a:effectStyle>
+        <a:effectStyle>
+          <a:effectLst/>
+        </a:effectStyle>
+        <a:effectStyle>
+          <a:effectLst>
+            <a:outerShdw blurRad="57150" dist="19050" dir="5400000" algn="ctr" rotWithShape="0">
+              <a:srgbClr val="000000">
+                <a:alpha val="63000"/>
+              </a:srgbClr>
+            </a:outerShdw>
+          </a:effectLst>
+        </a:effectStyle>
+      </a:effectStyleLst>
+      <a:bgFillStyleLst>
+        <a:solidFill>
+          <a:schemeClr val="phClr"/>
+        </a:solidFill>
+        <a:solidFill>
+          <a:schemeClr val="phClr">
+            <a:tint val="95000"/>
+            <a:satMod val="170000"/>
+          </a:schemeClr>
+        </a:solidFill>
+        <a:gradFill rotWithShape="1">
+          <a:gsLst>
+            <a:gs pos="0">
+              <a:schemeClr val="phClr">
+                <a:tint val="93000"/>
+                <a:satMod val="150000"/>
+                <a:shade val="98000"/>
+                <a:lumMod val="102000"/>
+              </a:schemeClr>
+            </a:gs>
+            <a:gs pos="50000">
+              <a:schemeClr val="phClr">
+                <a:tint val="98000"/>
+                <a:satMod val="130000"/>
+                <a:shade val="90000"/>
+                <a:lumMod val="103000"/>
+              </a:schemeClr>
+            </a:gs>
+            <a:gs pos="100000">
+              <a:schemeClr val="phClr">
+                <a:shade val="63000"/>
+                <a:satMod val="120000"/>
+              </a:schemeClr>
+            </a:gs>
+          </a:gsLst>
+          <a:lin ang="5400000" scaled="0"/>
+        </a:gradFill>
+      </a:bgFillStyleLst>
+    </a:fmtScheme>
+  </a:themeElements>
+  <a:objectDefaults>
+    <a:lnDef>
+      <a:spPr/>
+      <a:bodyPr/>
+      <a:lstStyle/>
+      <a:style>
+        <a:lnRef idx="2">
+          <a:schemeClr val="accent1"/>
+        </a:lnRef>
+        <a:fillRef idx="0">
+          <a:schemeClr val="accent1"/>
+        </a:fillRef>
+        <a:effectRef idx="1">
+          <a:schemeClr val="accent1"/>
+        </a:effectRef>
+        <a:fontRef idx="minor">
+          <a:schemeClr val="tx1"/>
+        </a:fontRef>
+      </a:style>
+    </a:lnDef>
+  </a:objectDefaults>
+  <a:extraClrSchemeLst/>
+  <a:extLst>
+    <a:ext uri="{05A4C25C-085E-4340-85A3-A5531E510DB2}">
+      <thm15:themeFamily xmlns:thm15="http://schemas.microsoft.com/office/thememl/2012/main" name="Office Theme" id="{2E142A2C-CD16-42D6-873A-C26D2A0506FA}" vid="{1BDDFF52-6CD6-40A5-AB3C-68EB2F1E4D0A}"/>
+    </a:ext>
+  </a:extLst>
+</a:theme>
 </file>
</xml_diff>